<commit_message>
Moar slides until receive
</commit_message>
<xml_diff>
--- a/presentation.pptx
+++ b/presentation.pptx
@@ -5,17 +5,27 @@
     <p:sldMasterId id="2147483684" r:id="rId1"/>
   </p:sldMasterIdLst>
   <p:notesMasterIdLst>
-    <p:notesMasterId r:id="rId10"/>
+    <p:notesMasterId r:id="rId20"/>
   </p:notesMasterIdLst>
   <p:sldIdLst>
     <p:sldId id="278" r:id="rId2"/>
     <p:sldId id="490" r:id="rId3"/>
     <p:sldId id="491" r:id="rId4"/>
-    <p:sldId id="489" r:id="rId5"/>
-    <p:sldId id="267" r:id="rId6"/>
-    <p:sldId id="275" r:id="rId7"/>
-    <p:sldId id="268" r:id="rId8"/>
-    <p:sldId id="279" r:id="rId9"/>
+    <p:sldId id="258" r:id="rId5"/>
+    <p:sldId id="259" r:id="rId6"/>
+    <p:sldId id="260" r:id="rId7"/>
+    <p:sldId id="261" r:id="rId8"/>
+    <p:sldId id="492" r:id="rId9"/>
+    <p:sldId id="493" r:id="rId10"/>
+    <p:sldId id="494" r:id="rId11"/>
+    <p:sldId id="495" r:id="rId12"/>
+    <p:sldId id="496" r:id="rId13"/>
+    <p:sldId id="497" r:id="rId14"/>
+    <p:sldId id="489" r:id="rId15"/>
+    <p:sldId id="267" r:id="rId16"/>
+    <p:sldId id="275" r:id="rId17"/>
+    <p:sldId id="268" r:id="rId18"/>
+    <p:sldId id="279" r:id="rId19"/>
   </p:sldIdLst>
   <p:sldSz cx="12192000" cy="6858000"/>
   <p:notesSz cx="6858000" cy="9144000"/>
@@ -122,6 +132,16 @@
             <p14:sldId id="278"/>
             <p14:sldId id="490"/>
             <p14:sldId id="491"/>
+            <p14:sldId id="258"/>
+            <p14:sldId id="259"/>
+            <p14:sldId id="260"/>
+            <p14:sldId id="261"/>
+            <p14:sldId id="492"/>
+            <p14:sldId id="493"/>
+            <p14:sldId id="494"/>
+            <p14:sldId id="495"/>
+            <p14:sldId id="496"/>
+            <p14:sldId id="497"/>
           </p14:sldIdLst>
         </p14:section>
         <p14:section name="Wrap up" id="{BCD9F38D-60DF-4459-9684-4C9C9939E42E}">
@@ -389,7 +409,7 @@
           <a:p>
             <a:fld id="{9BCA07FD-5BD5-4529-84B0-48DD2C561176}" type="slidenum">
               <a:rPr lang="de-CH" smtClean="0"/>
-              <a:t>‹Nr.›</a:t>
+              <a:t>‹#›</a:t>
             </a:fld>
             <a:endParaRPr lang="de-CH"/>
           </a:p>
@@ -582,6 +602,1069 @@
 </p:notes>
 </file>
 
+<file path=ppt/notesSlides/notesSlide10.xml><?xml version="1.0" encoding="utf-8"?>
+<p:notes xmlns:a="http://schemas.openxmlformats.org/drawingml/2006/main" xmlns:r="http://schemas.openxmlformats.org/officeDocument/2006/relationships" xmlns:p="http://schemas.openxmlformats.org/presentationml/2006/main">
+  <p:cSld>
+    <p:spTree>
+      <p:nvGrpSpPr>
+        <p:cNvPr id="1" name=""/>
+        <p:cNvGrpSpPr/>
+        <p:nvPr/>
+      </p:nvGrpSpPr>
+      <p:grpSpPr>
+        <a:xfrm>
+          <a:off x="0" y="0"/>
+          <a:ext cx="0" cy="0"/>
+          <a:chOff x="0" y="0"/>
+          <a:chExt cx="0" cy="0"/>
+        </a:xfrm>
+      </p:grpSpPr>
+      <p:sp>
+        <p:nvSpPr>
+          <p:cNvPr id="2" name="Slide Image Placeholder 1"/>
+          <p:cNvSpPr>
+            <a:spLocks noGrp="1" noRot="1" noChangeAspect="1"/>
+          </p:cNvSpPr>
+          <p:nvPr>
+            <p:ph type="sldImg"/>
+          </p:nvPr>
+        </p:nvSpPr>
+        <p:spPr/>
+      </p:sp>
+      <p:sp>
+        <p:nvSpPr>
+          <p:cNvPr id="3" name="Notes Placeholder 2"/>
+          <p:cNvSpPr>
+            <a:spLocks noGrp="1"/>
+          </p:cNvSpPr>
+          <p:nvPr>
+            <p:ph type="body" idx="1"/>
+          </p:nvPr>
+        </p:nvSpPr>
+        <p:spPr/>
+        <p:txBody>
+          <a:bodyPr/>
+          <a:lstStyle/>
+          <a:p>
+            <a:r>
+              <a:rPr lang="en-CA" dirty="0"/>
+              <a:t>AMQP + </a:t>
+            </a:r>
+            <a:r>
+              <a:rPr lang="en-CA" dirty="0" err="1"/>
+              <a:t>WebSockets</a:t>
+            </a:r>
+            <a:endParaRPr lang="en-CA" dirty="0"/>
+          </a:p>
+          <a:p>
+            <a:r>
+              <a:rPr lang="en-CA" dirty="0"/>
+              <a:t>On the broker side, the new client is speaking AMQP 1.0 and no more SBMP protocol.</a:t>
+            </a:r>
+          </a:p>
+          <a:p>
+            <a:r>
+              <a:rPr lang="en-CA" dirty="0"/>
+              <a:t>Meaning interoperability and less constraints (number of concurrent connections: 1K vs 5K)</a:t>
+            </a:r>
+          </a:p>
+          <a:p>
+            <a:endParaRPr lang="en-US" dirty="0"/>
+          </a:p>
+        </p:txBody>
+      </p:sp>
+      <p:sp>
+        <p:nvSpPr>
+          <p:cNvPr id="4" name="Slide Number Placeholder 3"/>
+          <p:cNvSpPr>
+            <a:spLocks noGrp="1"/>
+          </p:cNvSpPr>
+          <p:nvPr>
+            <p:ph type="sldNum" sz="quarter" idx="5"/>
+          </p:nvPr>
+        </p:nvSpPr>
+        <p:spPr/>
+        <p:txBody>
+          <a:bodyPr/>
+          <a:lstStyle/>
+          <a:p>
+            <a:fld id="{9BCA07FD-5BD5-4529-84B0-48DD2C561176}" type="slidenum">
+              <a:rPr lang="de-CH" smtClean="0"/>
+              <a:t>10</a:t>
+            </a:fld>
+            <a:endParaRPr lang="de-CH"/>
+          </a:p>
+        </p:txBody>
+      </p:sp>
+    </p:spTree>
+    <p:extLst>
+      <p:ext uri="{BB962C8B-B14F-4D97-AF65-F5344CB8AC3E}">
+        <p14:creationId xmlns:p14="http://schemas.microsoft.com/office/powerpoint/2010/main" val="1864507071"/>
+      </p:ext>
+    </p:extLst>
+  </p:cSld>
+  <p:clrMapOvr>
+    <a:masterClrMapping/>
+  </p:clrMapOvr>
+</p:notes>
+</file>
+
+<file path=ppt/notesSlides/notesSlide11.xml><?xml version="1.0" encoding="utf-8"?>
+<p:notes xmlns:a="http://schemas.openxmlformats.org/drawingml/2006/main" xmlns:r="http://schemas.openxmlformats.org/officeDocument/2006/relationships" xmlns:p="http://schemas.openxmlformats.org/presentationml/2006/main">
+  <p:cSld>
+    <p:spTree>
+      <p:nvGrpSpPr>
+        <p:cNvPr id="1" name=""/>
+        <p:cNvGrpSpPr/>
+        <p:nvPr/>
+      </p:nvGrpSpPr>
+      <p:grpSpPr>
+        <a:xfrm>
+          <a:off x="0" y="0"/>
+          <a:ext cx="0" cy="0"/>
+          <a:chOff x="0" y="0"/>
+          <a:chExt cx="0" cy="0"/>
+        </a:xfrm>
+      </p:grpSpPr>
+      <p:sp>
+        <p:nvSpPr>
+          <p:cNvPr id="2" name="Slide Image Placeholder 1"/>
+          <p:cNvSpPr>
+            <a:spLocks noGrp="1" noRot="1" noChangeAspect="1"/>
+          </p:cNvSpPr>
+          <p:nvPr>
+            <p:ph type="sldImg"/>
+          </p:nvPr>
+        </p:nvSpPr>
+        <p:spPr/>
+      </p:sp>
+      <p:sp>
+        <p:nvSpPr>
+          <p:cNvPr id="3" name="Notes Placeholder 2"/>
+          <p:cNvSpPr>
+            <a:spLocks noGrp="1"/>
+          </p:cNvSpPr>
+          <p:nvPr>
+            <p:ph type="body" idx="1"/>
+          </p:nvPr>
+        </p:nvSpPr>
+        <p:spPr/>
+        <p:txBody>
+          <a:bodyPr/>
+          <a:lstStyle/>
+          <a:p>
+            <a:pPr marL="0" marR="0" lvl="0" indent="0" algn="l" defTabSz="914400" rtl="0" eaLnBrk="1" fontAlgn="auto" latinLnBrk="0" hangingPunct="1">
+              <a:lnSpc>
+                <a:spcPct val="100000"/>
+              </a:lnSpc>
+              <a:spcBef>
+                <a:spcPts val="0"/>
+              </a:spcBef>
+              <a:spcAft>
+                <a:spcPts val="0"/>
+              </a:spcAft>
+              <a:buClrTx/>
+              <a:buSzTx/>
+              <a:buFontTx/>
+              <a:buNone/>
+              <a:tabLst/>
+              <a:defRPr/>
+            </a:pPr>
+            <a:r>
+              <a:rPr lang="en-CA" dirty="0"/>
+              <a:t>Sending a message -&gt; </a:t>
+            </a:r>
+            <a:r>
+              <a:rPr lang="en-CA" sz="1200" b="0" kern="1200" dirty="0" err="1">
+                <a:solidFill>
+                  <a:schemeClr val="tx1"/>
+                </a:solidFill>
+                <a:effectLst/>
+                <a:latin typeface="+mn-lt"/>
+                <a:ea typeface="+mn-ea"/>
+                <a:cs typeface="+mn-cs"/>
+              </a:rPr>
+              <a:t>MessagingEntityNotFoundException</a:t>
+            </a:r>
+            <a:r>
+              <a:rPr lang="en-CA" sz="1200" b="0" kern="1200" dirty="0">
+                <a:solidFill>
+                  <a:schemeClr val="tx1"/>
+                </a:solidFill>
+                <a:effectLst/>
+                <a:latin typeface="+mn-lt"/>
+                <a:ea typeface="+mn-ea"/>
+                <a:cs typeface="+mn-cs"/>
+              </a:rPr>
+              <a:t> -&gt; tooling</a:t>
+            </a:r>
+            <a:endParaRPr lang="en-CA" b="0" dirty="0"/>
+          </a:p>
+          <a:p>
+            <a:r>
+              <a:rPr lang="en-US" dirty="0" err="1"/>
+              <a:t>QueuClient.SendAsync</a:t>
+            </a:r>
+            <a:endParaRPr lang="en-US" dirty="0"/>
+          </a:p>
+        </p:txBody>
+      </p:sp>
+      <p:sp>
+        <p:nvSpPr>
+          <p:cNvPr id="4" name="Slide Number Placeholder 3"/>
+          <p:cNvSpPr>
+            <a:spLocks noGrp="1"/>
+          </p:cNvSpPr>
+          <p:nvPr>
+            <p:ph type="sldNum" sz="quarter" idx="5"/>
+          </p:nvPr>
+        </p:nvSpPr>
+        <p:spPr/>
+        <p:txBody>
+          <a:bodyPr/>
+          <a:lstStyle/>
+          <a:p>
+            <a:fld id="{9BCA07FD-5BD5-4529-84B0-48DD2C561176}" type="slidenum">
+              <a:rPr lang="de-CH" smtClean="0"/>
+              <a:t>11</a:t>
+            </a:fld>
+            <a:endParaRPr lang="de-CH"/>
+          </a:p>
+        </p:txBody>
+      </p:sp>
+    </p:spTree>
+    <p:extLst>
+      <p:ext uri="{BB962C8B-B14F-4D97-AF65-F5344CB8AC3E}">
+        <p14:creationId xmlns:p14="http://schemas.microsoft.com/office/powerpoint/2010/main" val="1030098325"/>
+      </p:ext>
+    </p:extLst>
+  </p:cSld>
+  <p:clrMapOvr>
+    <a:masterClrMapping/>
+  </p:clrMapOvr>
+</p:notes>
+</file>
+
+<file path=ppt/notesSlides/notesSlide12.xml><?xml version="1.0" encoding="utf-8"?>
+<p:notes xmlns:a="http://schemas.openxmlformats.org/drawingml/2006/main" xmlns:r="http://schemas.openxmlformats.org/officeDocument/2006/relationships" xmlns:p="http://schemas.openxmlformats.org/presentationml/2006/main">
+  <p:cSld>
+    <p:spTree>
+      <p:nvGrpSpPr>
+        <p:cNvPr id="1" name=""/>
+        <p:cNvGrpSpPr/>
+        <p:nvPr/>
+      </p:nvGrpSpPr>
+      <p:grpSpPr>
+        <a:xfrm>
+          <a:off x="0" y="0"/>
+          <a:ext cx="0" cy="0"/>
+          <a:chOff x="0" y="0"/>
+          <a:chExt cx="0" cy="0"/>
+        </a:xfrm>
+      </p:grpSpPr>
+      <p:sp>
+        <p:nvSpPr>
+          <p:cNvPr id="2" name="Slide Image Placeholder 1"/>
+          <p:cNvSpPr>
+            <a:spLocks noGrp="1" noRot="1" noChangeAspect="1"/>
+          </p:cNvSpPr>
+          <p:nvPr>
+            <p:ph type="sldImg"/>
+          </p:nvPr>
+        </p:nvSpPr>
+        <p:spPr/>
+      </p:sp>
+      <p:sp>
+        <p:nvSpPr>
+          <p:cNvPr id="3" name="Notes Placeholder 2"/>
+          <p:cNvSpPr>
+            <a:spLocks noGrp="1"/>
+          </p:cNvSpPr>
+          <p:nvPr>
+            <p:ph type="body" idx="1"/>
+          </p:nvPr>
+        </p:nvSpPr>
+        <p:spPr/>
+        <p:txBody>
+          <a:bodyPr/>
+          <a:lstStyle/>
+          <a:p>
+            <a:pPr marL="0" marR="0" lvl="0" indent="0" algn="l" defTabSz="914400" rtl="0" eaLnBrk="1" fontAlgn="auto" latinLnBrk="0" hangingPunct="1">
+              <a:lnSpc>
+                <a:spcPct val="100000"/>
+              </a:lnSpc>
+              <a:spcBef>
+                <a:spcPts val="0"/>
+              </a:spcBef>
+              <a:spcAft>
+                <a:spcPts val="0"/>
+              </a:spcAft>
+              <a:buClrTx/>
+              <a:buSzTx/>
+              <a:buFontTx/>
+              <a:buNone/>
+              <a:tabLst/>
+              <a:defRPr/>
+            </a:pPr>
+            <a:r>
+              <a:rPr lang="en-US" dirty="0"/>
+              <a:t>How do we receive? There are two options available</a:t>
+            </a:r>
+          </a:p>
+          <a:p>
+            <a:pPr marL="171450" marR="0" lvl="0" indent="-171450" algn="l" defTabSz="914400" rtl="0" eaLnBrk="1" fontAlgn="auto" latinLnBrk="0" hangingPunct="1">
+              <a:lnSpc>
+                <a:spcPct val="100000"/>
+              </a:lnSpc>
+              <a:spcBef>
+                <a:spcPts val="0"/>
+              </a:spcBef>
+              <a:spcAft>
+                <a:spcPts val="0"/>
+              </a:spcAft>
+              <a:buClrTx/>
+              <a:buSzTx/>
+              <a:buFontTx/>
+              <a:buChar char="-"/>
+              <a:tabLst/>
+              <a:defRPr/>
+            </a:pPr>
+            <a:r>
+              <a:rPr lang="en-US" dirty="0" err="1"/>
+              <a:t>MessageReceiver.ReceiveAsync</a:t>
+            </a:r>
+            <a:r>
+              <a:rPr lang="en-US" dirty="0"/>
+              <a:t>(message) is fragile requires to do manual heavy lifting such as concurrency etc. Also hard to understand</a:t>
+            </a:r>
+          </a:p>
+          <a:p>
+            <a:pPr marL="171450" marR="0" lvl="0" indent="-171450" algn="l" defTabSz="914400" rtl="0" eaLnBrk="1" fontAlgn="auto" latinLnBrk="0" hangingPunct="1">
+              <a:lnSpc>
+                <a:spcPct val="100000"/>
+              </a:lnSpc>
+              <a:spcBef>
+                <a:spcPts val="0"/>
+              </a:spcBef>
+              <a:spcAft>
+                <a:spcPts val="0"/>
+              </a:spcAft>
+              <a:buClrTx/>
+              <a:buSzTx/>
+              <a:buFontTx/>
+              <a:buChar char="-"/>
+              <a:tabLst/>
+              <a:defRPr/>
+            </a:pPr>
+            <a:r>
+              <a:rPr lang="en-US" dirty="0"/>
+              <a:t>Use message handlers instead</a:t>
+            </a:r>
+          </a:p>
+          <a:p>
+            <a:pPr marL="171450" marR="0" lvl="0" indent="-171450" algn="l" defTabSz="914400" rtl="0" eaLnBrk="1" fontAlgn="auto" latinLnBrk="0" hangingPunct="1">
+              <a:lnSpc>
+                <a:spcPct val="100000"/>
+              </a:lnSpc>
+              <a:spcBef>
+                <a:spcPts val="0"/>
+              </a:spcBef>
+              <a:spcAft>
+                <a:spcPts val="0"/>
+              </a:spcAft>
+              <a:buClrTx/>
+              <a:buSzTx/>
+              <a:buFontTx/>
+              <a:buChar char="-"/>
+              <a:tabLst/>
+              <a:defRPr/>
+            </a:pPr>
+            <a:endParaRPr lang="en-US" dirty="0"/>
+          </a:p>
+          <a:p>
+            <a:r>
+              <a:rPr lang="en-CA" dirty="0" err="1"/>
+              <a:t>MessageHandlerOptions</a:t>
+            </a:r>
+            <a:endParaRPr lang="en-CA" dirty="0"/>
+          </a:p>
+          <a:p>
+            <a:pPr marL="171450" indent="-171450">
+              <a:buFontTx/>
+              <a:buChar char="-"/>
+            </a:pPr>
+            <a:r>
+              <a:rPr lang="en-CA" dirty="0"/>
+              <a:t>Exception handler with </a:t>
+            </a:r>
+            <a:r>
+              <a:rPr lang="en-CA" dirty="0" err="1"/>
+              <a:t>ExceptionReceiveContext</a:t>
+            </a:r>
+            <a:endParaRPr lang="en-CA" dirty="0"/>
+          </a:p>
+          <a:p>
+            <a:pPr marL="171450" indent="-171450">
+              <a:buFontTx/>
+              <a:buChar char="-"/>
+            </a:pPr>
+            <a:r>
+              <a:rPr lang="en-CA" dirty="0"/>
+              <a:t>AutoComplete (defaults to true)</a:t>
+            </a:r>
+          </a:p>
+          <a:p>
+            <a:pPr marL="171450" indent="-171450">
+              <a:buFontTx/>
+              <a:buChar char="-"/>
+            </a:pPr>
+            <a:r>
+              <a:rPr lang="en-CA" dirty="0" err="1"/>
+              <a:t>MaxConcurrentCalls</a:t>
+            </a:r>
+            <a:r>
+              <a:rPr lang="en-CA" dirty="0"/>
+              <a:t> (defaults to one)</a:t>
+            </a:r>
+          </a:p>
+          <a:p>
+            <a:pPr marL="171450" indent="-171450">
+              <a:buFontTx/>
+              <a:buChar char="-"/>
+            </a:pPr>
+            <a:r>
+              <a:rPr lang="en-CA" dirty="0" err="1"/>
+              <a:t>MaxAutoRenewDuration</a:t>
+            </a:r>
+            <a:r>
+              <a:rPr lang="en-CA" dirty="0"/>
+              <a:t> (defaults to 5mins)</a:t>
+            </a:r>
+          </a:p>
+          <a:p>
+            <a:pPr marL="171450" indent="-171450">
+              <a:buFontTx/>
+              <a:buChar char="-"/>
+            </a:pPr>
+            <a:endParaRPr lang="en-CA" dirty="0"/>
+          </a:p>
+          <a:p>
+            <a:r>
+              <a:rPr lang="en-CA" dirty="0"/>
+              <a:t>What’s the right way? If you need to process incoming messages one by one and don’t want to build message pump logic, </a:t>
+            </a:r>
+            <a:r>
+              <a:rPr lang="en-CA" dirty="0" err="1"/>
+              <a:t>MessageHandler</a:t>
+            </a:r>
+            <a:r>
+              <a:rPr lang="en-CA" dirty="0"/>
+              <a:t> is a good option.</a:t>
+            </a:r>
+          </a:p>
+          <a:p>
+            <a:r>
+              <a:rPr lang="en-CA" dirty="0"/>
+              <a:t>If batching is important, manual receive is a better option.</a:t>
+            </a:r>
+          </a:p>
+          <a:p>
+            <a:pPr marL="171450" marR="0" lvl="0" indent="-171450" algn="l" defTabSz="914400" rtl="0" eaLnBrk="1" fontAlgn="auto" latinLnBrk="0" hangingPunct="1">
+              <a:lnSpc>
+                <a:spcPct val="100000"/>
+              </a:lnSpc>
+              <a:spcBef>
+                <a:spcPts val="0"/>
+              </a:spcBef>
+              <a:spcAft>
+                <a:spcPts val="0"/>
+              </a:spcAft>
+              <a:buClrTx/>
+              <a:buSzTx/>
+              <a:buFontTx/>
+              <a:buChar char="-"/>
+              <a:tabLst/>
+              <a:defRPr/>
+            </a:pPr>
+            <a:endParaRPr lang="en-US" dirty="0"/>
+          </a:p>
+          <a:p>
+            <a:pPr marL="171450" marR="0" lvl="0" indent="-171450" algn="l" defTabSz="914400" rtl="0" eaLnBrk="1" fontAlgn="auto" latinLnBrk="0" hangingPunct="1">
+              <a:lnSpc>
+                <a:spcPct val="100000"/>
+              </a:lnSpc>
+              <a:spcBef>
+                <a:spcPts val="0"/>
+              </a:spcBef>
+              <a:spcAft>
+                <a:spcPts val="0"/>
+              </a:spcAft>
+              <a:buClrTx/>
+              <a:buSzTx/>
+              <a:buFontTx/>
+              <a:buChar char="-"/>
+              <a:tabLst/>
+              <a:defRPr/>
+            </a:pPr>
+            <a:endParaRPr lang="en-US" dirty="0"/>
+          </a:p>
+        </p:txBody>
+      </p:sp>
+      <p:sp>
+        <p:nvSpPr>
+          <p:cNvPr id="4" name="Slide Number Placeholder 3"/>
+          <p:cNvSpPr>
+            <a:spLocks noGrp="1"/>
+          </p:cNvSpPr>
+          <p:nvPr>
+            <p:ph type="sldNum" sz="quarter" idx="5"/>
+          </p:nvPr>
+        </p:nvSpPr>
+        <p:spPr/>
+        <p:txBody>
+          <a:bodyPr/>
+          <a:lstStyle/>
+          <a:p>
+            <a:fld id="{9BCA07FD-5BD5-4529-84B0-48DD2C561176}" type="slidenum">
+              <a:rPr lang="de-CH" smtClean="0"/>
+              <a:t>12</a:t>
+            </a:fld>
+            <a:endParaRPr lang="de-CH"/>
+          </a:p>
+        </p:txBody>
+      </p:sp>
+    </p:spTree>
+    <p:extLst>
+      <p:ext uri="{BB962C8B-B14F-4D97-AF65-F5344CB8AC3E}">
+        <p14:creationId xmlns:p14="http://schemas.microsoft.com/office/powerpoint/2010/main" val="483044625"/>
+      </p:ext>
+    </p:extLst>
+  </p:cSld>
+  <p:clrMapOvr>
+    <a:masterClrMapping/>
+  </p:clrMapOvr>
+</p:notes>
+</file>
+
+<file path=ppt/notesSlides/notesSlide13.xml><?xml version="1.0" encoding="utf-8"?>
+<p:notes xmlns:a="http://schemas.openxmlformats.org/drawingml/2006/main" xmlns:r="http://schemas.openxmlformats.org/officeDocument/2006/relationships" xmlns:p="http://schemas.openxmlformats.org/presentationml/2006/main">
+  <p:cSld>
+    <p:spTree>
+      <p:nvGrpSpPr>
+        <p:cNvPr id="1" name=""/>
+        <p:cNvGrpSpPr/>
+        <p:nvPr/>
+      </p:nvGrpSpPr>
+      <p:grpSpPr>
+        <a:xfrm>
+          <a:off x="0" y="0"/>
+          <a:ext cx="0" cy="0"/>
+          <a:chOff x="0" y="0"/>
+          <a:chExt cx="0" cy="0"/>
+        </a:xfrm>
+      </p:grpSpPr>
+      <p:sp>
+        <p:nvSpPr>
+          <p:cNvPr id="2" name="Slide Image Placeholder 1"/>
+          <p:cNvSpPr>
+            <a:spLocks noGrp="1" noRot="1" noChangeAspect="1"/>
+          </p:cNvSpPr>
+          <p:nvPr>
+            <p:ph type="sldImg"/>
+          </p:nvPr>
+        </p:nvSpPr>
+        <p:spPr/>
+      </p:sp>
+      <p:sp>
+        <p:nvSpPr>
+          <p:cNvPr id="3" name="Notes Placeholder 2"/>
+          <p:cNvSpPr>
+            <a:spLocks noGrp="1"/>
+          </p:cNvSpPr>
+          <p:nvPr>
+            <p:ph type="body" idx="1"/>
+          </p:nvPr>
+        </p:nvSpPr>
+        <p:spPr/>
+        <p:txBody>
+          <a:bodyPr/>
+          <a:lstStyle/>
+          <a:p>
+            <a:r>
+              <a:rPr lang="en-US" dirty="0"/>
+              <a:t>Sender and Receiver are abstract types that are allow to send and receive from topics and queues</a:t>
+            </a:r>
+          </a:p>
+        </p:txBody>
+      </p:sp>
+      <p:sp>
+        <p:nvSpPr>
+          <p:cNvPr id="4" name="Slide Number Placeholder 3"/>
+          <p:cNvSpPr>
+            <a:spLocks noGrp="1"/>
+          </p:cNvSpPr>
+          <p:nvPr>
+            <p:ph type="sldNum" sz="quarter" idx="5"/>
+          </p:nvPr>
+        </p:nvSpPr>
+        <p:spPr/>
+        <p:txBody>
+          <a:bodyPr/>
+          <a:lstStyle/>
+          <a:p>
+            <a:fld id="{9BCA07FD-5BD5-4529-84B0-48DD2C561176}" type="slidenum">
+              <a:rPr lang="de-CH" smtClean="0"/>
+              <a:t>13</a:t>
+            </a:fld>
+            <a:endParaRPr lang="de-CH"/>
+          </a:p>
+        </p:txBody>
+      </p:sp>
+    </p:spTree>
+    <p:extLst>
+      <p:ext uri="{BB962C8B-B14F-4D97-AF65-F5344CB8AC3E}">
+        <p14:creationId xmlns:p14="http://schemas.microsoft.com/office/powerpoint/2010/main" val="1521539082"/>
+      </p:ext>
+    </p:extLst>
+  </p:cSld>
+  <p:clrMapOvr>
+    <a:masterClrMapping/>
+  </p:clrMapOvr>
+</p:notes>
+</file>
+
+<file path=ppt/notesSlides/notesSlide14.xml><?xml version="1.0" encoding="utf-8"?>
+<p:notes xmlns:a="http://schemas.openxmlformats.org/drawingml/2006/main" xmlns:r="http://schemas.openxmlformats.org/officeDocument/2006/relationships" xmlns:p="http://schemas.openxmlformats.org/presentationml/2006/main">
+  <p:cSld>
+    <p:spTree>
+      <p:nvGrpSpPr>
+        <p:cNvPr id="1" name=""/>
+        <p:cNvGrpSpPr/>
+        <p:nvPr/>
+      </p:nvGrpSpPr>
+      <p:grpSpPr>
+        <a:xfrm>
+          <a:off x="0" y="0"/>
+          <a:ext cx="0" cy="0"/>
+          <a:chOff x="0" y="0"/>
+          <a:chExt cx="0" cy="0"/>
+        </a:xfrm>
+      </p:grpSpPr>
+      <p:sp>
+        <p:nvSpPr>
+          <p:cNvPr id="2" name="Slide Image Placeholder 1"/>
+          <p:cNvSpPr>
+            <a:spLocks noGrp="1" noRot="1" noChangeAspect="1"/>
+          </p:cNvSpPr>
+          <p:nvPr>
+            <p:ph type="sldImg"/>
+          </p:nvPr>
+        </p:nvSpPr>
+        <p:spPr/>
+      </p:sp>
+      <p:sp>
+        <p:nvSpPr>
+          <p:cNvPr id="3" name="Notes Placeholder 2"/>
+          <p:cNvSpPr>
+            <a:spLocks noGrp="1"/>
+          </p:cNvSpPr>
+          <p:nvPr>
+            <p:ph type="body" idx="1"/>
+          </p:nvPr>
+        </p:nvSpPr>
+        <p:spPr/>
+        <p:txBody>
+          <a:bodyPr/>
+          <a:lstStyle/>
+          <a:p>
+            <a:r>
+              <a:rPr lang="de-CH" dirty="0" err="1"/>
+              <a:t>Thanks</a:t>
+            </a:r>
+            <a:endParaRPr lang="de-CH" dirty="0"/>
+          </a:p>
+        </p:txBody>
+      </p:sp>
+      <p:sp>
+        <p:nvSpPr>
+          <p:cNvPr id="4" name="Slide Number Placeholder 3"/>
+          <p:cNvSpPr>
+            <a:spLocks noGrp="1"/>
+          </p:cNvSpPr>
+          <p:nvPr>
+            <p:ph type="sldNum" sz="quarter" idx="10"/>
+          </p:nvPr>
+        </p:nvSpPr>
+        <p:spPr/>
+        <p:txBody>
+          <a:bodyPr/>
+          <a:lstStyle/>
+          <a:p>
+            <a:fld id="{9BCA07FD-5BD5-4529-84B0-48DD2C561176}" type="slidenum">
+              <a:rPr lang="de-CH" smtClean="0"/>
+              <a:t>14</a:t>
+            </a:fld>
+            <a:endParaRPr lang="de-CH"/>
+          </a:p>
+        </p:txBody>
+      </p:sp>
+    </p:spTree>
+    <p:extLst>
+      <p:ext uri="{BB962C8B-B14F-4D97-AF65-F5344CB8AC3E}">
+        <p14:creationId xmlns:p14="http://schemas.microsoft.com/office/powerpoint/2010/main" val="1171336995"/>
+      </p:ext>
+    </p:extLst>
+  </p:cSld>
+  <p:clrMapOvr>
+    <a:masterClrMapping/>
+  </p:clrMapOvr>
+</p:notes>
+</file>
+
+<file path=ppt/notesSlides/notesSlide15.xml><?xml version="1.0" encoding="utf-8"?>
+<p:notes xmlns:a="http://schemas.openxmlformats.org/drawingml/2006/main" xmlns:r="http://schemas.openxmlformats.org/officeDocument/2006/relationships" xmlns:p="http://schemas.openxmlformats.org/presentationml/2006/main">
+  <p:cSld>
+    <p:spTree>
+      <p:nvGrpSpPr>
+        <p:cNvPr id="1" name=""/>
+        <p:cNvGrpSpPr/>
+        <p:nvPr/>
+      </p:nvGrpSpPr>
+      <p:grpSpPr>
+        <a:xfrm>
+          <a:off x="0" y="0"/>
+          <a:ext cx="0" cy="0"/>
+          <a:chOff x="0" y="0"/>
+          <a:chExt cx="0" cy="0"/>
+        </a:xfrm>
+      </p:grpSpPr>
+      <p:sp>
+        <p:nvSpPr>
+          <p:cNvPr id="2" name="Slide Image Placeholder 1"/>
+          <p:cNvSpPr>
+            <a:spLocks noGrp="1" noRot="1" noChangeAspect="1"/>
+          </p:cNvSpPr>
+          <p:nvPr>
+            <p:ph type="sldImg"/>
+          </p:nvPr>
+        </p:nvSpPr>
+        <p:spPr/>
+      </p:sp>
+      <p:sp>
+        <p:nvSpPr>
+          <p:cNvPr id="3" name="Notes Placeholder 2"/>
+          <p:cNvSpPr>
+            <a:spLocks noGrp="1"/>
+          </p:cNvSpPr>
+          <p:nvPr>
+            <p:ph type="body" idx="1"/>
+          </p:nvPr>
+        </p:nvSpPr>
+        <p:spPr/>
+        <p:txBody>
+          <a:bodyPr/>
+          <a:lstStyle/>
+          <a:p>
+            <a:endParaRPr lang="de-CH" dirty="0"/>
+          </a:p>
+        </p:txBody>
+      </p:sp>
+      <p:sp>
+        <p:nvSpPr>
+          <p:cNvPr id="4" name="Slide Number Placeholder 3"/>
+          <p:cNvSpPr>
+            <a:spLocks noGrp="1"/>
+          </p:cNvSpPr>
+          <p:nvPr>
+            <p:ph type="sldNum" sz="quarter" idx="10"/>
+          </p:nvPr>
+        </p:nvSpPr>
+        <p:spPr/>
+        <p:txBody>
+          <a:bodyPr/>
+          <a:lstStyle/>
+          <a:p>
+            <a:fld id="{9BCA07FD-5BD5-4529-84B0-48DD2C561176}" type="slidenum">
+              <a:rPr lang="de-CH" smtClean="0"/>
+              <a:t>15</a:t>
+            </a:fld>
+            <a:endParaRPr lang="de-CH"/>
+          </a:p>
+        </p:txBody>
+      </p:sp>
+    </p:spTree>
+    <p:extLst>
+      <p:ext uri="{BB962C8B-B14F-4D97-AF65-F5344CB8AC3E}">
+        <p14:creationId xmlns:p14="http://schemas.microsoft.com/office/powerpoint/2010/main" val="3670487613"/>
+      </p:ext>
+    </p:extLst>
+  </p:cSld>
+  <p:clrMapOvr>
+    <a:masterClrMapping/>
+  </p:clrMapOvr>
+</p:notes>
+</file>
+
+<file path=ppt/notesSlides/notesSlide16.xml><?xml version="1.0" encoding="utf-8"?>
+<p:notes xmlns:a="http://schemas.openxmlformats.org/drawingml/2006/main" xmlns:r="http://schemas.openxmlformats.org/officeDocument/2006/relationships" xmlns:p="http://schemas.openxmlformats.org/presentationml/2006/main">
+  <p:cSld>
+    <p:spTree>
+      <p:nvGrpSpPr>
+        <p:cNvPr id="1" name=""/>
+        <p:cNvGrpSpPr/>
+        <p:nvPr/>
+      </p:nvGrpSpPr>
+      <p:grpSpPr>
+        <a:xfrm>
+          <a:off x="0" y="0"/>
+          <a:ext cx="0" cy="0"/>
+          <a:chOff x="0" y="0"/>
+          <a:chExt cx="0" cy="0"/>
+        </a:xfrm>
+      </p:grpSpPr>
+      <p:sp>
+        <p:nvSpPr>
+          <p:cNvPr id="2" name="Slide Image Placeholder 1"/>
+          <p:cNvSpPr>
+            <a:spLocks noGrp="1" noRot="1" noChangeAspect="1"/>
+          </p:cNvSpPr>
+          <p:nvPr>
+            <p:ph type="sldImg"/>
+          </p:nvPr>
+        </p:nvSpPr>
+        <p:spPr/>
+      </p:sp>
+      <p:sp>
+        <p:nvSpPr>
+          <p:cNvPr id="3" name="Notes Placeholder 2"/>
+          <p:cNvSpPr>
+            <a:spLocks noGrp="1"/>
+          </p:cNvSpPr>
+          <p:nvPr>
+            <p:ph type="body" idx="1"/>
+          </p:nvPr>
+        </p:nvSpPr>
+        <p:spPr/>
+        <p:txBody>
+          <a:bodyPr/>
+          <a:lstStyle/>
+          <a:p>
+            <a:endParaRPr lang="de-CH" dirty="0"/>
+          </a:p>
+        </p:txBody>
+      </p:sp>
+      <p:sp>
+        <p:nvSpPr>
+          <p:cNvPr id="4" name="Slide Number Placeholder 3"/>
+          <p:cNvSpPr>
+            <a:spLocks noGrp="1"/>
+          </p:cNvSpPr>
+          <p:nvPr>
+            <p:ph type="sldNum" sz="quarter" idx="10"/>
+          </p:nvPr>
+        </p:nvSpPr>
+        <p:spPr/>
+        <p:txBody>
+          <a:bodyPr/>
+          <a:lstStyle/>
+          <a:p>
+            <a:fld id="{9BCA07FD-5BD5-4529-84B0-48DD2C561176}" type="slidenum">
+              <a:rPr lang="de-CH" smtClean="0"/>
+              <a:t>16</a:t>
+            </a:fld>
+            <a:endParaRPr lang="de-CH"/>
+          </a:p>
+        </p:txBody>
+      </p:sp>
+    </p:spTree>
+    <p:extLst>
+      <p:ext uri="{BB962C8B-B14F-4D97-AF65-F5344CB8AC3E}">
+        <p14:creationId xmlns:p14="http://schemas.microsoft.com/office/powerpoint/2010/main" val="978782014"/>
+      </p:ext>
+    </p:extLst>
+  </p:cSld>
+  <p:clrMapOvr>
+    <a:masterClrMapping/>
+  </p:clrMapOvr>
+</p:notes>
+</file>
+
+<file path=ppt/notesSlides/notesSlide17.xml><?xml version="1.0" encoding="utf-8"?>
+<p:notes xmlns:a="http://schemas.openxmlformats.org/drawingml/2006/main" xmlns:r="http://schemas.openxmlformats.org/officeDocument/2006/relationships" xmlns:p="http://schemas.openxmlformats.org/presentationml/2006/main">
+  <p:cSld>
+    <p:spTree>
+      <p:nvGrpSpPr>
+        <p:cNvPr id="1" name=""/>
+        <p:cNvGrpSpPr/>
+        <p:nvPr/>
+      </p:nvGrpSpPr>
+      <p:grpSpPr>
+        <a:xfrm>
+          <a:off x="0" y="0"/>
+          <a:ext cx="0" cy="0"/>
+          <a:chOff x="0" y="0"/>
+          <a:chExt cx="0" cy="0"/>
+        </a:xfrm>
+      </p:grpSpPr>
+      <p:sp>
+        <p:nvSpPr>
+          <p:cNvPr id="2" name="Slide Image Placeholder 1"/>
+          <p:cNvSpPr>
+            <a:spLocks noGrp="1" noRot="1" noChangeAspect="1"/>
+          </p:cNvSpPr>
+          <p:nvPr>
+            <p:ph type="sldImg"/>
+          </p:nvPr>
+        </p:nvSpPr>
+        <p:spPr/>
+      </p:sp>
+      <p:sp>
+        <p:nvSpPr>
+          <p:cNvPr id="3" name="Notes Placeholder 2"/>
+          <p:cNvSpPr>
+            <a:spLocks noGrp="1"/>
+          </p:cNvSpPr>
+          <p:nvPr>
+            <p:ph type="body" idx="1"/>
+          </p:nvPr>
+        </p:nvSpPr>
+        <p:spPr/>
+        <p:txBody>
+          <a:bodyPr/>
+          <a:lstStyle/>
+          <a:p>
+            <a:endParaRPr lang="de-CH" dirty="0"/>
+          </a:p>
+        </p:txBody>
+      </p:sp>
+      <p:sp>
+        <p:nvSpPr>
+          <p:cNvPr id="4" name="Slide Number Placeholder 3"/>
+          <p:cNvSpPr>
+            <a:spLocks noGrp="1"/>
+          </p:cNvSpPr>
+          <p:nvPr>
+            <p:ph type="sldNum" sz="quarter" idx="10"/>
+          </p:nvPr>
+        </p:nvSpPr>
+        <p:spPr/>
+        <p:txBody>
+          <a:bodyPr/>
+          <a:lstStyle/>
+          <a:p>
+            <a:fld id="{9BCA07FD-5BD5-4529-84B0-48DD2C561176}" type="slidenum">
+              <a:rPr lang="de-CH" smtClean="0"/>
+              <a:t>17</a:t>
+            </a:fld>
+            <a:endParaRPr lang="de-CH"/>
+          </a:p>
+        </p:txBody>
+      </p:sp>
+    </p:spTree>
+    <p:extLst>
+      <p:ext uri="{BB962C8B-B14F-4D97-AF65-F5344CB8AC3E}">
+        <p14:creationId xmlns:p14="http://schemas.microsoft.com/office/powerpoint/2010/main" val="88145516"/>
+      </p:ext>
+    </p:extLst>
+  </p:cSld>
+  <p:clrMapOvr>
+    <a:masterClrMapping/>
+  </p:clrMapOvr>
+</p:notes>
+</file>
+
+<file path=ppt/notesSlides/notesSlide18.xml><?xml version="1.0" encoding="utf-8"?>
+<p:notes xmlns:a="http://schemas.openxmlformats.org/drawingml/2006/main" xmlns:r="http://schemas.openxmlformats.org/officeDocument/2006/relationships" xmlns:p="http://schemas.openxmlformats.org/presentationml/2006/main">
+  <p:cSld>
+    <p:spTree>
+      <p:nvGrpSpPr>
+        <p:cNvPr id="1" name=""/>
+        <p:cNvGrpSpPr/>
+        <p:nvPr/>
+      </p:nvGrpSpPr>
+      <p:grpSpPr>
+        <a:xfrm>
+          <a:off x="0" y="0"/>
+          <a:ext cx="0" cy="0"/>
+          <a:chOff x="0" y="0"/>
+          <a:chExt cx="0" cy="0"/>
+        </a:xfrm>
+      </p:grpSpPr>
+      <p:sp>
+        <p:nvSpPr>
+          <p:cNvPr id="2" name="Slide Image Placeholder 1"/>
+          <p:cNvSpPr>
+            <a:spLocks noGrp="1" noRot="1" noChangeAspect="1"/>
+          </p:cNvSpPr>
+          <p:nvPr>
+            <p:ph type="sldImg"/>
+          </p:nvPr>
+        </p:nvSpPr>
+        <p:spPr/>
+      </p:sp>
+      <p:sp>
+        <p:nvSpPr>
+          <p:cNvPr id="3" name="Notes Placeholder 2"/>
+          <p:cNvSpPr>
+            <a:spLocks noGrp="1"/>
+          </p:cNvSpPr>
+          <p:nvPr>
+            <p:ph type="body" idx="1"/>
+          </p:nvPr>
+        </p:nvSpPr>
+        <p:spPr/>
+        <p:txBody>
+          <a:bodyPr/>
+          <a:lstStyle/>
+          <a:p>
+            <a:r>
+              <a:rPr lang="de-CH" dirty="0"/>
+              <a:t>Thank you very much</a:t>
+            </a:r>
+            <a:r>
+              <a:rPr lang="de-CH" baseline="0" dirty="0"/>
+              <a:t> for listening and see you next time</a:t>
+            </a:r>
+            <a:endParaRPr lang="de-CH" dirty="0"/>
+          </a:p>
+        </p:txBody>
+      </p:sp>
+      <p:sp>
+        <p:nvSpPr>
+          <p:cNvPr id="4" name="Slide Number Placeholder 3"/>
+          <p:cNvSpPr>
+            <a:spLocks noGrp="1"/>
+          </p:cNvSpPr>
+          <p:nvPr>
+            <p:ph type="sldNum" sz="quarter" idx="10"/>
+          </p:nvPr>
+        </p:nvSpPr>
+        <p:spPr/>
+        <p:txBody>
+          <a:bodyPr/>
+          <a:lstStyle/>
+          <a:p>
+            <a:fld id="{9BCA07FD-5BD5-4529-84B0-48DD2C561176}" type="slidenum">
+              <a:rPr lang="de-CH" smtClean="0"/>
+              <a:t>18</a:t>
+            </a:fld>
+            <a:endParaRPr lang="de-CH"/>
+          </a:p>
+        </p:txBody>
+      </p:sp>
+    </p:spTree>
+    <p:extLst>
+      <p:ext uri="{BB962C8B-B14F-4D97-AF65-F5344CB8AC3E}">
+        <p14:creationId xmlns:p14="http://schemas.microsoft.com/office/powerpoint/2010/main" val="3949593976"/>
+      </p:ext>
+    </p:extLst>
+  </p:cSld>
+  <p:clrMapOvr>
+    <a:masterClrMapping/>
+  </p:clrMapOvr>
+</p:notes>
+</file>
+
 <file path=ppt/notesSlides/notesSlide2.xml><?xml version="1.0" encoding="utf-8"?>
 <p:notes xmlns:a="http://schemas.openxmlformats.org/drawingml/2006/main" xmlns:r="http://schemas.openxmlformats.org/officeDocument/2006/relationships" xmlns:p="http://schemas.openxmlformats.org/presentationml/2006/main">
   <p:cSld>
@@ -1524,11 +2607,7 @@
           <a:bodyPr/>
           <a:lstStyle/>
           <a:p>
-            <a:r>
-              <a:rPr lang="de-CH" dirty="0" err="1"/>
-              <a:t>Thanks</a:t>
-            </a:r>
-            <a:endParaRPr lang="de-CH" dirty="0"/>
+            <a:endParaRPr lang="en-CA" dirty="0"/>
           </a:p>
         </p:txBody>
       </p:sp>
@@ -1547,18 +2626,18 @@
           <a:bodyPr/>
           <a:lstStyle/>
           <a:p>
-            <a:fld id="{9BCA07FD-5BD5-4529-84B0-48DD2C561176}" type="slidenum">
-              <a:rPr lang="de-CH" smtClean="0"/>
+            <a:fld id="{8DF7B682-A23C-4AC9-A63F-72C4BE33EF59}" type="slidenum">
+              <a:rPr lang="en-CA" smtClean="0"/>
               <a:t>4</a:t>
             </a:fld>
-            <a:endParaRPr lang="de-CH"/>
+            <a:endParaRPr lang="en-CA"/>
           </a:p>
         </p:txBody>
       </p:sp>
     </p:spTree>
     <p:extLst>
       <p:ext uri="{BB962C8B-B14F-4D97-AF65-F5344CB8AC3E}">
-        <p14:creationId xmlns:p14="http://schemas.microsoft.com/office/powerpoint/2010/main" val="1171336995"/>
+        <p14:creationId xmlns:p14="http://schemas.microsoft.com/office/powerpoint/2010/main" val="390383533"/>
       </p:ext>
     </p:extLst>
   </p:cSld>
@@ -1612,7 +2691,10 @@
           <a:bodyPr/>
           <a:lstStyle/>
           <a:p>
-            <a:endParaRPr lang="de-CH" dirty="0"/>
+            <a:r>
+              <a:rPr lang="en-CA" dirty="0"/>
+              <a:t>A few months a go the picture looked liked the following</a:t>
+            </a:r>
           </a:p>
         </p:txBody>
       </p:sp>
@@ -1631,18 +2713,18 @@
           <a:bodyPr/>
           <a:lstStyle/>
           <a:p>
-            <a:fld id="{9BCA07FD-5BD5-4529-84B0-48DD2C561176}" type="slidenum">
-              <a:rPr lang="de-CH" smtClean="0"/>
+            <a:fld id="{8DF7B682-A23C-4AC9-A63F-72C4BE33EF59}" type="slidenum">
+              <a:rPr lang="en-CA" smtClean="0"/>
               <a:t>5</a:t>
             </a:fld>
-            <a:endParaRPr lang="de-CH"/>
+            <a:endParaRPr lang="en-CA"/>
           </a:p>
         </p:txBody>
       </p:sp>
     </p:spTree>
     <p:extLst>
       <p:ext uri="{BB962C8B-B14F-4D97-AF65-F5344CB8AC3E}">
-        <p14:creationId xmlns:p14="http://schemas.microsoft.com/office/powerpoint/2010/main" val="3670487613"/>
+        <p14:creationId xmlns:p14="http://schemas.microsoft.com/office/powerpoint/2010/main" val="138247059"/>
       </p:ext>
     </p:extLst>
   </p:cSld>
@@ -1696,7 +2778,7 @@
           <a:bodyPr/>
           <a:lstStyle/>
           <a:p>
-            <a:endParaRPr lang="de-CH" dirty="0"/>
+            <a:endParaRPr lang="en-CA" dirty="0"/>
           </a:p>
         </p:txBody>
       </p:sp>
@@ -1715,18 +2797,18 @@
           <a:bodyPr/>
           <a:lstStyle/>
           <a:p>
-            <a:fld id="{9BCA07FD-5BD5-4529-84B0-48DD2C561176}" type="slidenum">
-              <a:rPr lang="de-CH" smtClean="0"/>
+            <a:fld id="{8DF7B682-A23C-4AC9-A63F-72C4BE33EF59}" type="slidenum">
+              <a:rPr lang="en-CA" smtClean="0"/>
               <a:t>6</a:t>
             </a:fld>
-            <a:endParaRPr lang="de-CH"/>
+            <a:endParaRPr lang="en-CA"/>
           </a:p>
         </p:txBody>
       </p:sp>
     </p:spTree>
     <p:extLst>
       <p:ext uri="{BB962C8B-B14F-4D97-AF65-F5344CB8AC3E}">
-        <p14:creationId xmlns:p14="http://schemas.microsoft.com/office/powerpoint/2010/main" val="978782014"/>
+        <p14:creationId xmlns:p14="http://schemas.microsoft.com/office/powerpoint/2010/main" val="3009925859"/>
       </p:ext>
     </p:extLst>
   </p:cSld>
@@ -1780,7 +2862,7 @@
           <a:bodyPr/>
           <a:lstStyle/>
           <a:p>
-            <a:endParaRPr lang="de-CH" dirty="0"/>
+            <a:endParaRPr lang="en-CA" dirty="0"/>
           </a:p>
         </p:txBody>
       </p:sp>
@@ -1799,18 +2881,18 @@
           <a:bodyPr/>
           <a:lstStyle/>
           <a:p>
-            <a:fld id="{9BCA07FD-5BD5-4529-84B0-48DD2C561176}" type="slidenum">
-              <a:rPr lang="de-CH" smtClean="0"/>
+            <a:fld id="{8DF7B682-A23C-4AC9-A63F-72C4BE33EF59}" type="slidenum">
+              <a:rPr lang="en-CA" smtClean="0"/>
               <a:t>7</a:t>
             </a:fld>
-            <a:endParaRPr lang="de-CH"/>
+            <a:endParaRPr lang="en-CA"/>
           </a:p>
         </p:txBody>
       </p:sp>
     </p:spTree>
     <p:extLst>
       <p:ext uri="{BB962C8B-B14F-4D97-AF65-F5344CB8AC3E}">
-        <p14:creationId xmlns:p14="http://schemas.microsoft.com/office/powerpoint/2010/main" val="88145516"/>
+        <p14:creationId xmlns:p14="http://schemas.microsoft.com/office/powerpoint/2010/main" val="292963996"/>
       </p:ext>
     </p:extLst>
   </p:cSld>
@@ -1864,15 +2946,7 @@
           <a:bodyPr/>
           <a:lstStyle/>
           <a:p>
-            <a:r>
-              <a:rPr lang="de-CH" dirty="0"/>
-              <a:t>Thank you very much</a:t>
-            </a:r>
-            <a:r>
-              <a:rPr lang="de-CH" baseline="0" dirty="0"/>
-              <a:t> for listening and see you next time</a:t>
-            </a:r>
-            <a:endParaRPr lang="de-CH" dirty="0"/>
+            <a:endParaRPr lang="en-US" dirty="0"/>
           </a:p>
         </p:txBody>
       </p:sp>
@@ -1883,7 +2957,7 @@
             <a:spLocks noGrp="1"/>
           </p:cNvSpPr>
           <p:nvPr>
-            <p:ph type="sldNum" sz="quarter" idx="10"/>
+            <p:ph type="sldNum" sz="quarter" idx="5"/>
           </p:nvPr>
         </p:nvSpPr>
         <p:spPr/>
@@ -1902,7 +2976,102 @@
     </p:spTree>
     <p:extLst>
       <p:ext uri="{BB962C8B-B14F-4D97-AF65-F5344CB8AC3E}">
-        <p14:creationId xmlns:p14="http://schemas.microsoft.com/office/powerpoint/2010/main" val="3949593976"/>
+        <p14:creationId xmlns:p14="http://schemas.microsoft.com/office/powerpoint/2010/main" val="622269783"/>
+      </p:ext>
+    </p:extLst>
+  </p:cSld>
+  <p:clrMapOvr>
+    <a:masterClrMapping/>
+  </p:clrMapOvr>
+</p:notes>
+</file>
+
+<file path=ppt/notesSlides/notesSlide9.xml><?xml version="1.0" encoding="utf-8"?>
+<p:notes xmlns:a="http://schemas.openxmlformats.org/drawingml/2006/main" xmlns:r="http://schemas.openxmlformats.org/officeDocument/2006/relationships" xmlns:p="http://schemas.openxmlformats.org/presentationml/2006/main">
+  <p:cSld>
+    <p:spTree>
+      <p:nvGrpSpPr>
+        <p:cNvPr id="1" name=""/>
+        <p:cNvGrpSpPr/>
+        <p:nvPr/>
+      </p:nvGrpSpPr>
+      <p:grpSpPr>
+        <a:xfrm>
+          <a:off x="0" y="0"/>
+          <a:ext cx="0" cy="0"/>
+          <a:chOff x="0" y="0"/>
+          <a:chExt cx="0" cy="0"/>
+        </a:xfrm>
+      </p:grpSpPr>
+      <p:sp>
+        <p:nvSpPr>
+          <p:cNvPr id="2" name="Slide Image Placeholder 1"/>
+          <p:cNvSpPr>
+            <a:spLocks noGrp="1" noRot="1" noChangeAspect="1"/>
+          </p:cNvSpPr>
+          <p:nvPr>
+            <p:ph type="sldImg"/>
+          </p:nvPr>
+        </p:nvSpPr>
+        <p:spPr/>
+      </p:sp>
+      <p:sp>
+        <p:nvSpPr>
+          <p:cNvPr id="3" name="Notes Placeholder 2"/>
+          <p:cNvSpPr>
+            <a:spLocks noGrp="1"/>
+          </p:cNvSpPr>
+          <p:nvPr>
+            <p:ph type="body" idx="1"/>
+          </p:nvPr>
+        </p:nvSpPr>
+        <p:spPr/>
+        <p:txBody>
+          <a:bodyPr/>
+          <a:lstStyle/>
+          <a:p>
+            <a:r>
+              <a:rPr lang="en-US" dirty="0"/>
+              <a:t>A new </a:t>
+            </a:r>
+            <a:r>
+              <a:rPr lang="en-US" dirty="0" err="1"/>
+              <a:t>mondo</a:t>
+            </a:r>
+            <a:r>
+              <a:rPr lang="en-US" dirty="0"/>
+              <a:t> repo home</a:t>
+            </a:r>
+          </a:p>
+        </p:txBody>
+      </p:sp>
+      <p:sp>
+        <p:nvSpPr>
+          <p:cNvPr id="4" name="Slide Number Placeholder 3"/>
+          <p:cNvSpPr>
+            <a:spLocks noGrp="1"/>
+          </p:cNvSpPr>
+          <p:nvPr>
+            <p:ph type="sldNum" sz="quarter" idx="5"/>
+          </p:nvPr>
+        </p:nvSpPr>
+        <p:spPr/>
+        <p:txBody>
+          <a:bodyPr/>
+          <a:lstStyle/>
+          <a:p>
+            <a:fld id="{9BCA07FD-5BD5-4529-84B0-48DD2C561176}" type="slidenum">
+              <a:rPr lang="de-CH" smtClean="0"/>
+              <a:t>9</a:t>
+            </a:fld>
+            <a:endParaRPr lang="de-CH"/>
+          </a:p>
+        </p:txBody>
+      </p:sp>
+    </p:spTree>
+    <p:extLst>
+      <p:ext uri="{BB962C8B-B14F-4D97-AF65-F5344CB8AC3E}">
+        <p14:creationId xmlns:p14="http://schemas.microsoft.com/office/powerpoint/2010/main" val="1619551499"/>
       </p:ext>
     </p:extLst>
   </p:cSld>
@@ -2085,7 +3254,7 @@
           <a:p>
             <a:fld id="{213CF880-6CB5-48AB-8FAF-28C50F70DB25}" type="slidenum">
               <a:rPr lang="de-CH" smtClean="0"/>
-              <a:t>‹Nr.›</a:t>
+              <a:t>‹#›</a:t>
             </a:fld>
             <a:endParaRPr lang="de-CH"/>
           </a:p>
@@ -2255,7 +3424,7 @@
           <a:p>
             <a:fld id="{213CF880-6CB5-48AB-8FAF-28C50F70DB25}" type="slidenum">
               <a:rPr lang="de-CH" smtClean="0"/>
-              <a:t>‹Nr.›</a:t>
+              <a:t>‹#›</a:t>
             </a:fld>
             <a:endParaRPr lang="de-CH"/>
           </a:p>
@@ -2435,7 +3604,7 @@
           <a:p>
             <a:fld id="{213CF880-6CB5-48AB-8FAF-28C50F70DB25}" type="slidenum">
               <a:rPr lang="de-CH" smtClean="0"/>
-              <a:t>‹Nr.›</a:t>
+              <a:t>‹#›</a:t>
             </a:fld>
             <a:endParaRPr lang="de-CH"/>
           </a:p>
@@ -2604,7 +3773,7 @@
           <a:p>
             <a:fld id="{213CF880-6CB5-48AB-8FAF-28C50F70DB25}" type="slidenum">
               <a:rPr lang="de-CH" smtClean="0"/>
-              <a:t>‹Nr.›</a:t>
+              <a:t>‹#›</a:t>
             </a:fld>
             <a:endParaRPr lang="de-CH"/>
           </a:p>
@@ -2850,7 +4019,7 @@
           <a:p>
             <a:fld id="{213CF880-6CB5-48AB-8FAF-28C50F70DB25}" type="slidenum">
               <a:rPr lang="de-CH" smtClean="0"/>
-              <a:t>‹Nr.›</a:t>
+              <a:t>‹#›</a:t>
             </a:fld>
             <a:endParaRPr lang="de-CH"/>
           </a:p>
@@ -3082,7 +4251,7 @@
           <a:p>
             <a:fld id="{213CF880-6CB5-48AB-8FAF-28C50F70DB25}" type="slidenum">
               <a:rPr lang="de-CH" smtClean="0"/>
-              <a:t>‹Nr.›</a:t>
+              <a:t>‹#›</a:t>
             </a:fld>
             <a:endParaRPr lang="de-CH"/>
           </a:p>
@@ -3449,7 +4618,7 @@
           <a:p>
             <a:fld id="{213CF880-6CB5-48AB-8FAF-28C50F70DB25}" type="slidenum">
               <a:rPr lang="de-CH" smtClean="0"/>
-              <a:t>‹Nr.›</a:t>
+              <a:t>‹#›</a:t>
             </a:fld>
             <a:endParaRPr lang="de-CH"/>
           </a:p>
@@ -3567,7 +4736,7 @@
           <a:p>
             <a:fld id="{213CF880-6CB5-48AB-8FAF-28C50F70DB25}" type="slidenum">
               <a:rPr lang="de-CH" smtClean="0"/>
-              <a:t>‹Nr.›</a:t>
+              <a:t>‹#›</a:t>
             </a:fld>
             <a:endParaRPr lang="de-CH"/>
           </a:p>
@@ -3662,7 +4831,7 @@
           <a:p>
             <a:fld id="{213CF880-6CB5-48AB-8FAF-28C50F70DB25}" type="slidenum">
               <a:rPr lang="de-CH" smtClean="0"/>
-              <a:t>‹Nr.›</a:t>
+              <a:t>‹#›</a:t>
             </a:fld>
             <a:endParaRPr lang="de-CH"/>
           </a:p>
@@ -3939,7 +5108,7 @@
           <a:p>
             <a:fld id="{213CF880-6CB5-48AB-8FAF-28C50F70DB25}" type="slidenum">
               <a:rPr lang="de-CH" smtClean="0"/>
-              <a:t>‹Nr.›</a:t>
+              <a:t>‹#›</a:t>
             </a:fld>
             <a:endParaRPr lang="de-CH"/>
           </a:p>
@@ -4196,7 +5365,7 @@
           <a:p>
             <a:fld id="{213CF880-6CB5-48AB-8FAF-28C50F70DB25}" type="slidenum">
               <a:rPr lang="de-CH" smtClean="0"/>
-              <a:t>‹Nr.›</a:t>
+              <a:t>‹#›</a:t>
             </a:fld>
             <a:endParaRPr lang="de-CH"/>
           </a:p>
@@ -4443,7 +5612,7 @@
           <a:p>
             <a:fld id="{213CF880-6CB5-48AB-8FAF-28C50F70DB25}" type="slidenum">
               <a:rPr lang="de-CH" smtClean="0"/>
-              <a:t>‹Nr.›</a:t>
+              <a:t>‹#›</a:t>
             </a:fld>
             <a:endParaRPr lang="de-CH"/>
           </a:p>
@@ -4893,6 +6062,972 @@
     <p:extLst>
       <p:ext uri="{BB962C8B-B14F-4D97-AF65-F5344CB8AC3E}">
         <p14:creationId xmlns:p14="http://schemas.microsoft.com/office/powerpoint/2010/main" val="1362569043"/>
+      </p:ext>
+    </p:extLst>
+  </p:cSld>
+  <p:clrMapOvr>
+    <a:masterClrMapping/>
+  </p:clrMapOvr>
+</p:sld>
+</file>
+
+<file path=ppt/slides/slide10.xml><?xml version="1.0" encoding="utf-8"?>
+<p:sld xmlns:a="http://schemas.openxmlformats.org/drawingml/2006/main" xmlns:r="http://schemas.openxmlformats.org/officeDocument/2006/relationships" xmlns:p="http://schemas.openxmlformats.org/presentationml/2006/main">
+  <p:cSld>
+    <p:spTree>
+      <p:nvGrpSpPr>
+        <p:cNvPr id="1" name=""/>
+        <p:cNvGrpSpPr/>
+        <p:nvPr/>
+      </p:nvGrpSpPr>
+      <p:grpSpPr>
+        <a:xfrm>
+          <a:off x="0" y="0"/>
+          <a:ext cx="0" cy="0"/>
+          <a:chOff x="0" y="0"/>
+          <a:chExt cx="0" cy="0"/>
+        </a:xfrm>
+      </p:grpSpPr>
+      <p:sp>
+        <p:nvSpPr>
+          <p:cNvPr id="2" name="Rectangle 1">
+            <a:extLst>
+              <a:ext uri="{FF2B5EF4-FFF2-40B4-BE49-F238E27FC236}">
+                <a16:creationId xmlns:a16="http://schemas.microsoft.com/office/drawing/2014/main" id="{45492B21-1F47-4942-92F0-0B7ACD27004B}"/>
+              </a:ext>
+            </a:extLst>
+          </p:cNvPr>
+          <p:cNvSpPr/>
+          <p:nvPr/>
+        </p:nvSpPr>
+        <p:spPr>
+          <a:xfrm>
+            <a:off x="2319165" y="1851645"/>
+            <a:ext cx="7553671" cy="3154710"/>
+          </a:xfrm>
+          <a:prstGeom prst="rect">
+            <a:avLst/>
+          </a:prstGeom>
+        </p:spPr>
+        <p:txBody>
+          <a:bodyPr wrap="none">
+            <a:spAutoFit/>
+          </a:bodyPr>
+          <a:lstStyle/>
+          <a:p>
+            <a:r>
+              <a:rPr lang="en-US" sz="19900" dirty="0">
+                <a:solidFill>
+                  <a:schemeClr val="accent2"/>
+                </a:solidFill>
+                <a:latin typeface="Yanone Kaffeesatz Regular" panose="02000000000000000000" pitchFamily="2" charset="0"/>
+              </a:rPr>
+              <a:t>AMQP 1.0</a:t>
+            </a:r>
+            <a:endParaRPr lang="de-CH" sz="2000" dirty="0"/>
+          </a:p>
+        </p:txBody>
+      </p:sp>
+    </p:spTree>
+    <p:extLst>
+      <p:ext uri="{BB962C8B-B14F-4D97-AF65-F5344CB8AC3E}">
+        <p14:creationId xmlns:p14="http://schemas.microsoft.com/office/powerpoint/2010/main" val="1492597061"/>
+      </p:ext>
+    </p:extLst>
+  </p:cSld>
+  <p:clrMapOvr>
+    <a:masterClrMapping/>
+  </p:clrMapOvr>
+</p:sld>
+</file>
+
+<file path=ppt/slides/slide11.xml><?xml version="1.0" encoding="utf-8"?>
+<p:sld xmlns:a="http://schemas.openxmlformats.org/drawingml/2006/main" xmlns:r="http://schemas.openxmlformats.org/officeDocument/2006/relationships" xmlns:p="http://schemas.openxmlformats.org/presentationml/2006/main">
+  <p:cSld>
+    <p:spTree>
+      <p:nvGrpSpPr>
+        <p:cNvPr id="1" name=""/>
+        <p:cNvGrpSpPr/>
+        <p:nvPr/>
+      </p:nvGrpSpPr>
+      <p:grpSpPr>
+        <a:xfrm>
+          <a:off x="0" y="0"/>
+          <a:ext cx="0" cy="0"/>
+          <a:chOff x="0" y="0"/>
+          <a:chExt cx="0" cy="0"/>
+        </a:xfrm>
+      </p:grpSpPr>
+      <p:sp>
+        <p:nvSpPr>
+          <p:cNvPr id="2" name="Rectangle 1">
+            <a:extLst>
+              <a:ext uri="{FF2B5EF4-FFF2-40B4-BE49-F238E27FC236}">
+                <a16:creationId xmlns:a16="http://schemas.microsoft.com/office/drawing/2014/main" id="{45492B21-1F47-4942-92F0-0B7ACD27004B}"/>
+              </a:ext>
+            </a:extLst>
+          </p:cNvPr>
+          <p:cNvSpPr/>
+          <p:nvPr/>
+        </p:nvSpPr>
+        <p:spPr>
+          <a:xfrm>
+            <a:off x="4105712" y="1851645"/>
+            <a:ext cx="3980577" cy="3154710"/>
+          </a:xfrm>
+          <a:prstGeom prst="rect">
+            <a:avLst/>
+          </a:prstGeom>
+        </p:spPr>
+        <p:txBody>
+          <a:bodyPr wrap="none">
+            <a:spAutoFit/>
+          </a:bodyPr>
+          <a:lstStyle/>
+          <a:p>
+            <a:r>
+              <a:rPr lang="en-US" sz="19900" dirty="0">
+                <a:solidFill>
+                  <a:schemeClr val="accent2"/>
+                </a:solidFill>
+                <a:latin typeface="Yanone Kaffeesatz Regular" panose="02000000000000000000" pitchFamily="2" charset="0"/>
+              </a:rPr>
+              <a:t>Send</a:t>
+            </a:r>
+            <a:endParaRPr lang="de-CH" sz="2000" dirty="0"/>
+          </a:p>
+        </p:txBody>
+      </p:sp>
+    </p:spTree>
+    <p:extLst>
+      <p:ext uri="{BB962C8B-B14F-4D97-AF65-F5344CB8AC3E}">
+        <p14:creationId xmlns:p14="http://schemas.microsoft.com/office/powerpoint/2010/main" val="2758945099"/>
+      </p:ext>
+    </p:extLst>
+  </p:cSld>
+  <p:clrMapOvr>
+    <a:masterClrMapping/>
+  </p:clrMapOvr>
+</p:sld>
+</file>
+
+<file path=ppt/slides/slide12.xml><?xml version="1.0" encoding="utf-8"?>
+<p:sld xmlns:a="http://schemas.openxmlformats.org/drawingml/2006/main" xmlns:r="http://schemas.openxmlformats.org/officeDocument/2006/relationships" xmlns:p="http://schemas.openxmlformats.org/presentationml/2006/main">
+  <p:cSld>
+    <p:spTree>
+      <p:nvGrpSpPr>
+        <p:cNvPr id="1" name=""/>
+        <p:cNvGrpSpPr/>
+        <p:nvPr/>
+      </p:nvGrpSpPr>
+      <p:grpSpPr>
+        <a:xfrm>
+          <a:off x="0" y="0"/>
+          <a:ext cx="0" cy="0"/>
+          <a:chOff x="0" y="0"/>
+          <a:chExt cx="0" cy="0"/>
+        </a:xfrm>
+      </p:grpSpPr>
+      <p:sp>
+        <p:nvSpPr>
+          <p:cNvPr id="2" name="Rectangle 1">
+            <a:extLst>
+              <a:ext uri="{FF2B5EF4-FFF2-40B4-BE49-F238E27FC236}">
+                <a16:creationId xmlns:a16="http://schemas.microsoft.com/office/drawing/2014/main" id="{45492B21-1F47-4942-92F0-0B7ACD27004B}"/>
+              </a:ext>
+            </a:extLst>
+          </p:cNvPr>
+          <p:cNvSpPr/>
+          <p:nvPr/>
+        </p:nvSpPr>
+        <p:spPr>
+          <a:xfrm>
+            <a:off x="3082996" y="1851645"/>
+            <a:ext cx="6026009" cy="3154710"/>
+          </a:xfrm>
+          <a:prstGeom prst="rect">
+            <a:avLst/>
+          </a:prstGeom>
+        </p:spPr>
+        <p:txBody>
+          <a:bodyPr wrap="none">
+            <a:spAutoFit/>
+          </a:bodyPr>
+          <a:lstStyle/>
+          <a:p>
+            <a:r>
+              <a:rPr lang="en-US" sz="19900" dirty="0">
+                <a:solidFill>
+                  <a:schemeClr val="accent2"/>
+                </a:solidFill>
+                <a:latin typeface="Yanone Kaffeesatz Regular" panose="02000000000000000000" pitchFamily="2" charset="0"/>
+              </a:rPr>
+              <a:t>Receive</a:t>
+            </a:r>
+            <a:endParaRPr lang="de-CH" sz="2000" dirty="0"/>
+          </a:p>
+        </p:txBody>
+      </p:sp>
+    </p:spTree>
+    <p:extLst>
+      <p:ext uri="{BB962C8B-B14F-4D97-AF65-F5344CB8AC3E}">
+        <p14:creationId xmlns:p14="http://schemas.microsoft.com/office/powerpoint/2010/main" val="4078030270"/>
+      </p:ext>
+    </p:extLst>
+  </p:cSld>
+  <p:clrMapOvr>
+    <a:masterClrMapping/>
+  </p:clrMapOvr>
+</p:sld>
+</file>
+
+<file path=ppt/slides/slide13.xml><?xml version="1.0" encoding="utf-8"?>
+<p:sld xmlns:a="http://schemas.openxmlformats.org/drawingml/2006/main" xmlns:r="http://schemas.openxmlformats.org/officeDocument/2006/relationships" xmlns:p="http://schemas.openxmlformats.org/presentationml/2006/main">
+  <p:cSld>
+    <p:spTree>
+      <p:nvGrpSpPr>
+        <p:cNvPr id="1" name=""/>
+        <p:cNvGrpSpPr/>
+        <p:nvPr/>
+      </p:nvGrpSpPr>
+      <p:grpSpPr>
+        <a:xfrm>
+          <a:off x="0" y="0"/>
+          <a:ext cx="0" cy="0"/>
+          <a:chOff x="0" y="0"/>
+          <a:chExt cx="0" cy="0"/>
+        </a:xfrm>
+      </p:grpSpPr>
+      <p:sp>
+        <p:nvSpPr>
+          <p:cNvPr id="3" name="Rectangle 2">
+            <a:extLst>
+              <a:ext uri="{FF2B5EF4-FFF2-40B4-BE49-F238E27FC236}">
+                <a16:creationId xmlns:a16="http://schemas.microsoft.com/office/drawing/2014/main" id="{07891161-E677-4E20-818D-7033E8E1D6F8}"/>
+              </a:ext>
+            </a:extLst>
+          </p:cNvPr>
+          <p:cNvSpPr/>
+          <p:nvPr/>
+        </p:nvSpPr>
+        <p:spPr>
+          <a:xfrm>
+            <a:off x="996288" y="2367171"/>
+            <a:ext cx="4588115" cy="2123658"/>
+          </a:xfrm>
+          <a:prstGeom prst="rect">
+            <a:avLst/>
+          </a:prstGeom>
+        </p:spPr>
+        <p:txBody>
+          <a:bodyPr wrap="none">
+            <a:spAutoFit/>
+          </a:bodyPr>
+          <a:lstStyle/>
+          <a:p>
+            <a:r>
+              <a:rPr lang="en-US" sz="6600" dirty="0" err="1">
+                <a:solidFill>
+                  <a:schemeClr val="accent4"/>
+                </a:solidFill>
+                <a:latin typeface="Yanone Kaffeesatz Regular" panose="02000000000000000000" pitchFamily="2" charset="0"/>
+              </a:rPr>
+              <a:t>MessageSender</a:t>
+            </a:r>
+            <a:endParaRPr lang="en-US" sz="6600" dirty="0">
+              <a:solidFill>
+                <a:schemeClr val="accent4"/>
+              </a:solidFill>
+              <a:latin typeface="Yanone Kaffeesatz Regular" panose="02000000000000000000" pitchFamily="2" charset="0"/>
+            </a:endParaRPr>
+          </a:p>
+          <a:p>
+            <a:r>
+              <a:rPr lang="en-US" sz="6600" dirty="0" err="1">
+                <a:solidFill>
+                  <a:schemeClr val="accent4"/>
+                </a:solidFill>
+                <a:latin typeface="Yanone Kaffeesatz Regular" panose="02000000000000000000" pitchFamily="2" charset="0"/>
+              </a:rPr>
+              <a:t>MessageReceiver</a:t>
+            </a:r>
+            <a:endParaRPr lang="de-CH" sz="2000" dirty="0">
+              <a:solidFill>
+                <a:schemeClr val="accent4"/>
+              </a:solidFill>
+            </a:endParaRPr>
+          </a:p>
+        </p:txBody>
+      </p:sp>
+      <p:sp>
+        <p:nvSpPr>
+          <p:cNvPr id="4" name="Rectangle 3">
+            <a:extLst>
+              <a:ext uri="{FF2B5EF4-FFF2-40B4-BE49-F238E27FC236}">
+                <a16:creationId xmlns:a16="http://schemas.microsoft.com/office/drawing/2014/main" id="{12573A0C-373D-4335-A89F-EB0C09A3ACE4}"/>
+              </a:ext>
+            </a:extLst>
+          </p:cNvPr>
+          <p:cNvSpPr/>
+          <p:nvPr/>
+        </p:nvSpPr>
+        <p:spPr>
+          <a:xfrm>
+            <a:off x="6705427" y="1859339"/>
+            <a:ext cx="4878259" cy="3139321"/>
+          </a:xfrm>
+          <a:prstGeom prst="rect">
+            <a:avLst/>
+          </a:prstGeom>
+        </p:spPr>
+        <p:txBody>
+          <a:bodyPr wrap="none">
+            <a:spAutoFit/>
+          </a:bodyPr>
+          <a:lstStyle/>
+          <a:p>
+            <a:r>
+              <a:rPr lang="en-US" sz="6600" dirty="0" err="1">
+                <a:solidFill>
+                  <a:schemeClr val="tx2"/>
+                </a:solidFill>
+                <a:latin typeface="Yanone Kaffeesatz Regular" panose="02000000000000000000" pitchFamily="2" charset="0"/>
+              </a:rPr>
+              <a:t>QueueClient</a:t>
+            </a:r>
+            <a:endParaRPr lang="en-US" sz="6600" dirty="0">
+              <a:solidFill>
+                <a:schemeClr val="tx2"/>
+              </a:solidFill>
+              <a:latin typeface="Yanone Kaffeesatz Regular" panose="02000000000000000000" pitchFamily="2" charset="0"/>
+            </a:endParaRPr>
+          </a:p>
+          <a:p>
+            <a:r>
+              <a:rPr lang="en-US" sz="6600" dirty="0" err="1">
+                <a:solidFill>
+                  <a:schemeClr val="tx2"/>
+                </a:solidFill>
+                <a:latin typeface="Yanone Kaffeesatz Regular" panose="02000000000000000000" pitchFamily="2" charset="0"/>
+              </a:rPr>
+              <a:t>TopicClient</a:t>
+            </a:r>
+            <a:endParaRPr lang="en-US" sz="6600" dirty="0">
+              <a:solidFill>
+                <a:schemeClr val="tx2"/>
+              </a:solidFill>
+              <a:latin typeface="Yanone Kaffeesatz Regular" panose="02000000000000000000" pitchFamily="2" charset="0"/>
+            </a:endParaRPr>
+          </a:p>
+          <a:p>
+            <a:r>
+              <a:rPr lang="en-US" sz="6600" dirty="0" err="1">
+                <a:solidFill>
+                  <a:schemeClr val="tx2"/>
+                </a:solidFill>
+                <a:latin typeface="Yanone Kaffeesatz Regular" panose="02000000000000000000" pitchFamily="2" charset="0"/>
+              </a:rPr>
+              <a:t>SubscriptionClient</a:t>
+            </a:r>
+            <a:endParaRPr lang="de-CH" sz="2000" dirty="0">
+              <a:solidFill>
+                <a:schemeClr val="tx2"/>
+              </a:solidFill>
+            </a:endParaRPr>
+          </a:p>
+        </p:txBody>
+      </p:sp>
+    </p:spTree>
+    <p:extLst>
+      <p:ext uri="{BB962C8B-B14F-4D97-AF65-F5344CB8AC3E}">
+        <p14:creationId xmlns:p14="http://schemas.microsoft.com/office/powerpoint/2010/main" val="3616405539"/>
+      </p:ext>
+    </p:extLst>
+  </p:cSld>
+  <p:clrMapOvr>
+    <a:masterClrMapping/>
+  </p:clrMapOvr>
+</p:sld>
+</file>
+
+<file path=ppt/slides/slide14.xml><?xml version="1.0" encoding="utf-8"?>
+<p:sld xmlns:a="http://schemas.openxmlformats.org/drawingml/2006/main" xmlns:r="http://schemas.openxmlformats.org/officeDocument/2006/relationships" xmlns:p="http://schemas.openxmlformats.org/presentationml/2006/main">
+  <p:cSld>
+    <p:spTree>
+      <p:nvGrpSpPr>
+        <p:cNvPr id="1" name=""/>
+        <p:cNvGrpSpPr/>
+        <p:nvPr/>
+      </p:nvGrpSpPr>
+      <p:grpSpPr>
+        <a:xfrm>
+          <a:off x="0" y="0"/>
+          <a:ext cx="0" cy="0"/>
+          <a:chOff x="0" y="0"/>
+          <a:chExt cx="0" cy="0"/>
+        </a:xfrm>
+      </p:grpSpPr>
+      <p:sp>
+        <p:nvSpPr>
+          <p:cNvPr id="2" name="Rectangle 1"/>
+          <p:cNvSpPr/>
+          <p:nvPr/>
+        </p:nvSpPr>
+        <p:spPr>
+          <a:xfrm>
+            <a:off x="3176771" y="1851645"/>
+            <a:ext cx="5838458" cy="3154710"/>
+          </a:xfrm>
+          <a:prstGeom prst="rect">
+            <a:avLst/>
+          </a:prstGeom>
+        </p:spPr>
+        <p:txBody>
+          <a:bodyPr wrap="none">
+            <a:spAutoFit/>
+          </a:bodyPr>
+          <a:lstStyle/>
+          <a:p>
+            <a:r>
+              <a:rPr lang="en-US" sz="19900" dirty="0">
+                <a:solidFill>
+                  <a:schemeClr val="accent2"/>
+                </a:solidFill>
+                <a:latin typeface="Yanone Kaffeesatz Regular" panose="02000000000000000000" pitchFamily="2" charset="0"/>
+              </a:rPr>
+              <a:t>Thanks</a:t>
+            </a:r>
+            <a:endParaRPr lang="de-CH" sz="2000" dirty="0"/>
+          </a:p>
+        </p:txBody>
+      </p:sp>
+      <p:pic>
+        <p:nvPicPr>
+          <p:cNvPr id="3" name="Picture 2"/>
+          <p:cNvPicPr>
+            <a:picLocks noChangeAspect="1"/>
+          </p:cNvPicPr>
+          <p:nvPr/>
+        </p:nvPicPr>
+        <p:blipFill>
+          <a:blip r:embed="rId3" cstate="print">
+            <a:extLst>
+              <a:ext uri="{28A0092B-C50C-407E-A947-70E740481C1C}">
+                <a14:useLocalDpi xmlns:a14="http://schemas.microsoft.com/office/drawing/2010/main" val="0"/>
+              </a:ext>
+            </a:extLst>
+          </a:blip>
+          <a:stretch>
+            <a:fillRect/>
+          </a:stretch>
+        </p:blipFill>
+        <p:spPr>
+          <a:xfrm>
+            <a:off x="8052306" y="612519"/>
+            <a:ext cx="2880000" cy="690817"/>
+          </a:xfrm>
+          <a:prstGeom prst="rect">
+            <a:avLst/>
+          </a:prstGeom>
+        </p:spPr>
+      </p:pic>
+    </p:spTree>
+    <p:extLst>
+      <p:ext uri="{BB962C8B-B14F-4D97-AF65-F5344CB8AC3E}">
+        <p14:creationId xmlns:p14="http://schemas.microsoft.com/office/powerpoint/2010/main" val="697477994"/>
+      </p:ext>
+    </p:extLst>
+  </p:cSld>
+  <p:clrMapOvr>
+    <a:masterClrMapping/>
+  </p:clrMapOvr>
+</p:sld>
+</file>
+
+<file path=ppt/slides/slide15.xml><?xml version="1.0" encoding="utf-8"?>
+<p:sld xmlns:a="http://schemas.openxmlformats.org/drawingml/2006/main" xmlns:r="http://schemas.openxmlformats.org/officeDocument/2006/relationships" xmlns:p="http://schemas.openxmlformats.org/presentationml/2006/main">
+  <p:cSld>
+    <p:spTree>
+      <p:nvGrpSpPr>
+        <p:cNvPr id="1" name=""/>
+        <p:cNvGrpSpPr/>
+        <p:nvPr/>
+      </p:nvGrpSpPr>
+      <p:grpSpPr>
+        <a:xfrm>
+          <a:off x="0" y="0"/>
+          <a:ext cx="0" cy="0"/>
+          <a:chOff x="0" y="0"/>
+          <a:chExt cx="0" cy="0"/>
+        </a:xfrm>
+      </p:grpSpPr>
+      <p:sp>
+        <p:nvSpPr>
+          <p:cNvPr id="2" name="Rectangle 1"/>
+          <p:cNvSpPr/>
+          <p:nvPr/>
+        </p:nvSpPr>
+        <p:spPr>
+          <a:xfrm>
+            <a:off x="1064014" y="3127733"/>
+            <a:ext cx="9685665" cy="923330"/>
+          </a:xfrm>
+          <a:prstGeom prst="rect">
+            <a:avLst/>
+          </a:prstGeom>
+        </p:spPr>
+        <p:txBody>
+          <a:bodyPr wrap="none">
+            <a:spAutoFit/>
+          </a:bodyPr>
+          <a:lstStyle/>
+          <a:p>
+            <a:r>
+              <a:rPr lang="en-US" sz="3600" dirty="0">
+                <a:solidFill>
+                  <a:schemeClr val="tx2"/>
+                </a:solidFill>
+                <a:latin typeface="Yanone Kaffeesatz Regular" panose="02000000000000000000" pitchFamily="2" charset="0"/>
+              </a:rPr>
+              <a:t>github.com/</a:t>
+            </a:r>
+            <a:r>
+              <a:rPr lang="en-US" sz="3600" dirty="0" err="1">
+                <a:solidFill>
+                  <a:schemeClr val="tx2"/>
+                </a:solidFill>
+                <a:latin typeface="Yanone Kaffeesatz Regular" panose="02000000000000000000" pitchFamily="2" charset="0"/>
+              </a:rPr>
+              <a:t>danielmarbach</a:t>
+            </a:r>
+            <a:r>
+              <a:rPr lang="en-US" sz="3600" dirty="0">
+                <a:solidFill>
+                  <a:schemeClr val="tx2"/>
+                </a:solidFill>
+                <a:latin typeface="Yanone Kaffeesatz Regular" panose="02000000000000000000" pitchFamily="2" charset="0"/>
+              </a:rPr>
+              <a:t>/</a:t>
+            </a:r>
+            <a:r>
+              <a:rPr lang="en-US" sz="5400" dirty="0" err="1">
+                <a:solidFill>
+                  <a:schemeClr val="accent4"/>
+                </a:solidFill>
+                <a:latin typeface="Yanone Kaffeesatz Regular" panose="02000000000000000000" pitchFamily="2" charset="0"/>
+              </a:rPr>
+              <a:t>AzureServiceBus.DeepDive</a:t>
+            </a:r>
+            <a:endParaRPr lang="de-CH" sz="5400" dirty="0">
+              <a:solidFill>
+                <a:schemeClr val="accent4"/>
+              </a:solidFill>
+              <a:latin typeface="Yanone Kaffeesatz Regular" panose="02000000000000000000" pitchFamily="2" charset="0"/>
+            </a:endParaRPr>
+          </a:p>
+        </p:txBody>
+      </p:sp>
+      <p:sp>
+        <p:nvSpPr>
+          <p:cNvPr id="4" name="Rectangle 3"/>
+          <p:cNvSpPr/>
+          <p:nvPr/>
+        </p:nvSpPr>
+        <p:spPr>
+          <a:xfrm>
+            <a:off x="1064014" y="1124536"/>
+            <a:ext cx="6463629" cy="1862048"/>
+          </a:xfrm>
+          <a:prstGeom prst="rect">
+            <a:avLst/>
+          </a:prstGeom>
+        </p:spPr>
+        <p:txBody>
+          <a:bodyPr wrap="none">
+            <a:spAutoFit/>
+          </a:bodyPr>
+          <a:lstStyle/>
+          <a:p>
+            <a:r>
+              <a:rPr lang="en-US" sz="11500" dirty="0">
+                <a:solidFill>
+                  <a:schemeClr val="accent2"/>
+                </a:solidFill>
+                <a:latin typeface="Yanone Kaffeesatz Regular" panose="02000000000000000000" pitchFamily="2" charset="0"/>
+              </a:rPr>
+              <a:t>Slides, Links…</a:t>
+            </a:r>
+            <a:endParaRPr lang="de-CH" sz="1400" dirty="0"/>
+          </a:p>
+        </p:txBody>
+      </p:sp>
+    </p:spTree>
+    <p:extLst>
+      <p:ext uri="{BB962C8B-B14F-4D97-AF65-F5344CB8AC3E}">
+        <p14:creationId xmlns:p14="http://schemas.microsoft.com/office/powerpoint/2010/main" val="1581449120"/>
+      </p:ext>
+    </p:extLst>
+  </p:cSld>
+  <p:clrMapOvr>
+    <a:masterClrMapping/>
+  </p:clrMapOvr>
+</p:sld>
+</file>
+
+<file path=ppt/slides/slide16.xml><?xml version="1.0" encoding="utf-8"?>
+<p:sld xmlns:a="http://schemas.openxmlformats.org/drawingml/2006/main" xmlns:r="http://schemas.openxmlformats.org/officeDocument/2006/relationships" xmlns:p="http://schemas.openxmlformats.org/presentationml/2006/main">
+  <p:cSld>
+    <p:spTree>
+      <p:nvGrpSpPr>
+        <p:cNvPr id="1" name=""/>
+        <p:cNvGrpSpPr/>
+        <p:nvPr/>
+      </p:nvGrpSpPr>
+      <p:grpSpPr>
+        <a:xfrm>
+          <a:off x="0" y="0"/>
+          <a:ext cx="0" cy="0"/>
+          <a:chOff x="0" y="0"/>
+          <a:chExt cx="0" cy="0"/>
+        </a:xfrm>
+      </p:grpSpPr>
+      <p:sp>
+        <p:nvSpPr>
+          <p:cNvPr id="2" name="Rectangle 1"/>
+          <p:cNvSpPr/>
+          <p:nvPr/>
+        </p:nvSpPr>
+        <p:spPr>
+          <a:xfrm>
+            <a:off x="3858849" y="1851645"/>
+            <a:ext cx="4474302" cy="3154710"/>
+          </a:xfrm>
+          <a:prstGeom prst="rect">
+            <a:avLst/>
+          </a:prstGeom>
+        </p:spPr>
+        <p:txBody>
+          <a:bodyPr wrap="none">
+            <a:spAutoFit/>
+          </a:bodyPr>
+          <a:lstStyle/>
+          <a:p>
+            <a:r>
+              <a:rPr lang="en-US" sz="19900" dirty="0">
+                <a:solidFill>
+                  <a:schemeClr val="accent2"/>
+                </a:solidFill>
+                <a:latin typeface="Yanone Kaffeesatz Regular" panose="02000000000000000000" pitchFamily="2" charset="0"/>
+              </a:rPr>
+              <a:t>Q &amp; A</a:t>
+            </a:r>
+            <a:endParaRPr lang="de-CH" sz="2000" dirty="0"/>
+          </a:p>
+        </p:txBody>
+      </p:sp>
+      <p:pic>
+        <p:nvPicPr>
+          <p:cNvPr id="4" name="Picture 3"/>
+          <p:cNvPicPr>
+            <a:picLocks noChangeAspect="1"/>
+          </p:cNvPicPr>
+          <p:nvPr/>
+        </p:nvPicPr>
+        <p:blipFill>
+          <a:blip r:embed="rId3" cstate="print">
+            <a:extLst>
+              <a:ext uri="{28A0092B-C50C-407E-A947-70E740481C1C}">
+                <a14:useLocalDpi xmlns:a14="http://schemas.microsoft.com/office/drawing/2010/main" val="0"/>
+              </a:ext>
+            </a:extLst>
+          </a:blip>
+          <a:stretch>
+            <a:fillRect/>
+          </a:stretch>
+        </p:blipFill>
+        <p:spPr>
+          <a:xfrm>
+            <a:off x="8052306" y="612519"/>
+            <a:ext cx="2880000" cy="690817"/>
+          </a:xfrm>
+          <a:prstGeom prst="rect">
+            <a:avLst/>
+          </a:prstGeom>
+        </p:spPr>
+      </p:pic>
+    </p:spTree>
+    <p:extLst>
+      <p:ext uri="{BB962C8B-B14F-4D97-AF65-F5344CB8AC3E}">
+        <p14:creationId xmlns:p14="http://schemas.microsoft.com/office/powerpoint/2010/main" val="4241321608"/>
+      </p:ext>
+    </p:extLst>
+  </p:cSld>
+  <p:clrMapOvr>
+    <a:masterClrMapping/>
+  </p:clrMapOvr>
+</p:sld>
+</file>
+
+<file path=ppt/slides/slide17.xml><?xml version="1.0" encoding="utf-8"?>
+<p:sld xmlns:a="http://schemas.openxmlformats.org/drawingml/2006/main" xmlns:r="http://schemas.openxmlformats.org/officeDocument/2006/relationships" xmlns:p="http://schemas.openxmlformats.org/presentationml/2006/main">
+  <p:cSld>
+    <p:spTree>
+      <p:nvGrpSpPr>
+        <p:cNvPr id="1" name=""/>
+        <p:cNvGrpSpPr/>
+        <p:nvPr/>
+      </p:nvGrpSpPr>
+      <p:grpSpPr>
+        <a:xfrm>
+          <a:off x="0" y="0"/>
+          <a:ext cx="0" cy="0"/>
+          <a:chOff x="0" y="0"/>
+          <a:chExt cx="0" cy="0"/>
+        </a:xfrm>
+      </p:grpSpPr>
+      <p:pic>
+        <p:nvPicPr>
+          <p:cNvPr id="3" name="Picture 2"/>
+          <p:cNvPicPr>
+            <a:picLocks noChangeAspect="1"/>
+          </p:cNvPicPr>
+          <p:nvPr/>
+        </p:nvPicPr>
+        <p:blipFill>
+          <a:blip r:embed="rId3" cstate="print">
+            <a:extLst>
+              <a:ext uri="{28A0092B-C50C-407E-A947-70E740481C1C}">
+                <a14:useLocalDpi xmlns:a14="http://schemas.microsoft.com/office/drawing/2010/main" val="0"/>
+              </a:ext>
+            </a:extLst>
+          </a:blip>
+          <a:stretch>
+            <a:fillRect/>
+          </a:stretch>
+        </p:blipFill>
+        <p:spPr>
+          <a:xfrm>
+            <a:off x="8052306" y="612519"/>
+            <a:ext cx="2880000" cy="690817"/>
+          </a:xfrm>
+          <a:prstGeom prst="rect">
+            <a:avLst/>
+          </a:prstGeom>
+        </p:spPr>
+      </p:pic>
+      <p:sp>
+        <p:nvSpPr>
+          <p:cNvPr id="2" name="Rectangle 1"/>
+          <p:cNvSpPr/>
+          <p:nvPr/>
+        </p:nvSpPr>
+        <p:spPr>
+          <a:xfrm>
+            <a:off x="5723694" y="2090172"/>
+            <a:ext cx="6096000" cy="2677656"/>
+          </a:xfrm>
+          <a:prstGeom prst="rect">
+            <a:avLst/>
+          </a:prstGeom>
+        </p:spPr>
+        <p:txBody>
+          <a:bodyPr>
+            <a:spAutoFit/>
+          </a:bodyPr>
+          <a:lstStyle/>
+          <a:p>
+            <a:r>
+              <a:rPr lang="en-US" sz="2800" dirty="0">
+                <a:solidFill>
+                  <a:schemeClr val="tx2"/>
+                </a:solidFill>
+                <a:latin typeface="Yanone Kaffeesatz Regular" panose="02000000000000000000" pitchFamily="2" charset="0"/>
+              </a:rPr>
+              <a:t>Software Engineer</a:t>
+            </a:r>
+          </a:p>
+          <a:p>
+            <a:r>
+              <a:rPr lang="en-US" sz="2800" dirty="0">
+                <a:solidFill>
+                  <a:schemeClr val="tx2"/>
+                </a:solidFill>
+                <a:latin typeface="Yanone Kaffeesatz Regular" panose="02000000000000000000" pitchFamily="2" charset="0"/>
+              </a:rPr>
+              <a:t>Microsoft MVP</a:t>
+            </a:r>
+          </a:p>
+          <a:p>
+            <a:endParaRPr lang="en-US" sz="2800" dirty="0">
+              <a:solidFill>
+                <a:schemeClr val="tx2"/>
+              </a:solidFill>
+              <a:latin typeface="Yanone Kaffeesatz Regular" panose="02000000000000000000" pitchFamily="2" charset="0"/>
+            </a:endParaRPr>
+          </a:p>
+          <a:p>
+            <a:r>
+              <a:rPr lang="en-US" sz="2800" dirty="0">
+                <a:solidFill>
+                  <a:schemeClr val="accent4"/>
+                </a:solidFill>
+                <a:latin typeface="Yanone Kaffeesatz Regular" panose="02000000000000000000" pitchFamily="2" charset="0"/>
+              </a:rPr>
+              <a:t>@danielmarbach</a:t>
+            </a:r>
+          </a:p>
+          <a:p>
+            <a:r>
+              <a:rPr lang="en-US" sz="2800" dirty="0">
+                <a:solidFill>
+                  <a:schemeClr val="accent4"/>
+                </a:solidFill>
+                <a:latin typeface="Yanone Kaffeesatz Regular" panose="02000000000000000000" pitchFamily="2" charset="0"/>
+              </a:rPr>
+              <a:t>particular.net/blog</a:t>
+            </a:r>
+          </a:p>
+          <a:p>
+            <a:r>
+              <a:rPr lang="en-US" sz="2800" dirty="0">
+                <a:solidFill>
+                  <a:schemeClr val="accent4"/>
+                </a:solidFill>
+                <a:latin typeface="Yanone Kaffeesatz Regular" panose="02000000000000000000" pitchFamily="2" charset="0"/>
+              </a:rPr>
+              <a:t>planetgeek.ch</a:t>
+            </a:r>
+          </a:p>
+        </p:txBody>
+      </p:sp>
+      <p:pic>
+        <p:nvPicPr>
+          <p:cNvPr id="6" name="Picture 5"/>
+          <p:cNvPicPr>
+            <a:picLocks noChangeAspect="1"/>
+          </p:cNvPicPr>
+          <p:nvPr/>
+        </p:nvPicPr>
+        <p:blipFill>
+          <a:blip r:embed="rId4" cstate="print">
+            <a:extLst>
+              <a:ext uri="{28A0092B-C50C-407E-A947-70E740481C1C}">
+                <a14:useLocalDpi xmlns:a14="http://schemas.microsoft.com/office/drawing/2010/main" val="0"/>
+              </a:ext>
+            </a:extLst>
+          </a:blip>
+          <a:stretch>
+            <a:fillRect/>
+          </a:stretch>
+        </p:blipFill>
+        <p:spPr>
+          <a:xfrm>
+            <a:off x="1852348" y="1768017"/>
+            <a:ext cx="2558625" cy="3837938"/>
+          </a:xfrm>
+          <a:prstGeom prst="rect">
+            <a:avLst/>
+          </a:prstGeom>
+        </p:spPr>
+      </p:pic>
+    </p:spTree>
+    <p:extLst>
+      <p:ext uri="{BB962C8B-B14F-4D97-AF65-F5344CB8AC3E}">
+        <p14:creationId xmlns:p14="http://schemas.microsoft.com/office/powerpoint/2010/main" val="3601279917"/>
+      </p:ext>
+    </p:extLst>
+  </p:cSld>
+  <p:clrMapOvr>
+    <a:masterClrMapping/>
+  </p:clrMapOvr>
+</p:sld>
+</file>
+
+<file path=ppt/slides/slide18.xml><?xml version="1.0" encoding="utf-8"?>
+<p:sld xmlns:a="http://schemas.openxmlformats.org/drawingml/2006/main" xmlns:r="http://schemas.openxmlformats.org/officeDocument/2006/relationships" xmlns:p="http://schemas.openxmlformats.org/presentationml/2006/main">
+  <p:cSld>
+    <p:spTree>
+      <p:nvGrpSpPr>
+        <p:cNvPr id="1" name=""/>
+        <p:cNvGrpSpPr/>
+        <p:nvPr/>
+      </p:nvGrpSpPr>
+      <p:grpSpPr>
+        <a:xfrm>
+          <a:off x="0" y="0"/>
+          <a:ext cx="0" cy="0"/>
+          <a:chOff x="0" y="0"/>
+          <a:chExt cx="0" cy="0"/>
+        </a:xfrm>
+      </p:grpSpPr>
+      <p:sp>
+        <p:nvSpPr>
+          <p:cNvPr id="2" name="Rectangle 1"/>
+          <p:cNvSpPr/>
+          <p:nvPr/>
+        </p:nvSpPr>
+        <p:spPr>
+          <a:xfrm>
+            <a:off x="3176771" y="1851645"/>
+            <a:ext cx="5838458" cy="3154710"/>
+          </a:xfrm>
+          <a:prstGeom prst="rect">
+            <a:avLst/>
+          </a:prstGeom>
+        </p:spPr>
+        <p:txBody>
+          <a:bodyPr wrap="none">
+            <a:spAutoFit/>
+          </a:bodyPr>
+          <a:lstStyle/>
+          <a:p>
+            <a:r>
+              <a:rPr lang="en-US" sz="19900" dirty="0">
+                <a:solidFill>
+                  <a:schemeClr val="accent2"/>
+                </a:solidFill>
+                <a:latin typeface="Yanone Kaffeesatz Regular" panose="02000000000000000000" pitchFamily="2" charset="0"/>
+              </a:rPr>
+              <a:t>Thanks</a:t>
+            </a:r>
+            <a:endParaRPr lang="de-CH" sz="2000" dirty="0"/>
+          </a:p>
+        </p:txBody>
+      </p:sp>
+      <p:pic>
+        <p:nvPicPr>
+          <p:cNvPr id="3" name="Picture 2"/>
+          <p:cNvPicPr>
+            <a:picLocks noChangeAspect="1"/>
+          </p:cNvPicPr>
+          <p:nvPr/>
+        </p:nvPicPr>
+        <p:blipFill>
+          <a:blip r:embed="rId3" cstate="print">
+            <a:extLst>
+              <a:ext uri="{28A0092B-C50C-407E-A947-70E740481C1C}">
+                <a14:useLocalDpi xmlns:a14="http://schemas.microsoft.com/office/drawing/2010/main" val="0"/>
+              </a:ext>
+            </a:extLst>
+          </a:blip>
+          <a:stretch>
+            <a:fillRect/>
+          </a:stretch>
+        </p:blipFill>
+        <p:spPr>
+          <a:xfrm>
+            <a:off x="8052306" y="612519"/>
+            <a:ext cx="2880000" cy="690817"/>
+          </a:xfrm>
+          <a:prstGeom prst="rect">
+            <a:avLst/>
+          </a:prstGeom>
+        </p:spPr>
+      </p:pic>
+    </p:spTree>
+    <p:extLst>
+      <p:ext uri="{BB962C8B-B14F-4D97-AF65-F5344CB8AC3E}">
+        <p14:creationId xmlns:p14="http://schemas.microsoft.com/office/powerpoint/2010/main" val="3887468163"/>
       </p:ext>
     </p:extLst>
   </p:cSld>
@@ -7469,74 +9604,57 @@
           <a:chExt cx="0" cy="0"/>
         </a:xfrm>
       </p:grpSpPr>
-      <p:sp>
-        <p:nvSpPr>
-          <p:cNvPr id="2" name="Rectangle 1"/>
-          <p:cNvSpPr/>
-          <p:nvPr/>
-        </p:nvSpPr>
-        <p:spPr>
-          <a:xfrm>
-            <a:off x="3176771" y="1851645"/>
-            <a:ext cx="5838458" cy="3154710"/>
-          </a:xfrm>
-          <a:prstGeom prst="rect">
-            <a:avLst/>
-          </a:prstGeom>
-        </p:spPr>
-        <p:txBody>
-          <a:bodyPr wrap="none">
-            <a:spAutoFit/>
-          </a:bodyPr>
-          <a:lstStyle/>
-          <a:p>
-            <a:r>
-              <a:rPr lang="en-US" sz="19900" dirty="0">
-                <a:solidFill>
-                  <a:schemeClr val="accent2"/>
-                </a:solidFill>
-                <a:latin typeface="Yanone Kaffeesatz Regular" panose="02000000000000000000" pitchFamily="2" charset="0"/>
-              </a:rPr>
-              <a:t>Thanks</a:t>
-            </a:r>
-            <a:endParaRPr lang="de-CH" sz="2000" dirty="0"/>
-          </a:p>
-        </p:txBody>
-      </p:sp>
       <p:pic>
         <p:nvPicPr>
-          <p:cNvPr id="3" name="Picture 2"/>
+          <p:cNvPr id="2052" name="Picture 4" descr="Image result for nuget logo">
+            <a:extLst>
+              <a:ext uri="{FF2B5EF4-FFF2-40B4-BE49-F238E27FC236}">
+                <a16:creationId xmlns:a16="http://schemas.microsoft.com/office/drawing/2014/main" id="{7B3357EE-97AF-4AF7-AB3A-719D9C3872CE}"/>
+              </a:ext>
+            </a:extLst>
+          </p:cNvPr>
           <p:cNvPicPr>
-            <a:picLocks noChangeAspect="1"/>
+            <a:picLocks noChangeAspect="1" noChangeArrowheads="1"/>
           </p:cNvPicPr>
           <p:nvPr/>
         </p:nvPicPr>
         <p:blipFill>
-          <a:blip r:embed="rId3" cstate="print">
+          <a:blip r:embed="rId3">
             <a:extLst>
               <a:ext uri="{28A0092B-C50C-407E-A947-70E740481C1C}">
                 <a14:useLocalDpi xmlns:a14="http://schemas.microsoft.com/office/drawing/2010/main" val="0"/>
               </a:ext>
             </a:extLst>
           </a:blip>
+          <a:srcRect/>
           <a:stretch>
             <a:fillRect/>
           </a:stretch>
         </p:blipFill>
-        <p:spPr>
+        <p:spPr bwMode="auto">
           <a:xfrm>
-            <a:off x="8052306" y="612519"/>
-            <a:ext cx="2880000" cy="690817"/>
+            <a:off x="2567765" y="2192288"/>
+            <a:ext cx="7414790" cy="2254497"/>
           </a:xfrm>
           <a:prstGeom prst="rect">
             <a:avLst/>
           </a:prstGeom>
+          <a:noFill/>
+          <a:extLst>
+            <a:ext uri="{909E8E84-426E-40DD-AFC4-6F175D3DCCD1}">
+              <a14:hiddenFill xmlns:a14="http://schemas.microsoft.com/office/drawing/2010/main">
+                <a:solidFill>
+                  <a:srgbClr val="FFFFFF"/>
+                </a:solidFill>
+              </a14:hiddenFill>
+            </a:ext>
+          </a:extLst>
         </p:spPr>
       </p:pic>
     </p:spTree>
     <p:extLst>
       <p:ext uri="{BB962C8B-B14F-4D97-AF65-F5344CB8AC3E}">
-        <p14:creationId xmlns:p14="http://schemas.microsoft.com/office/powerpoint/2010/main" val="697477994"/>
+        <p14:creationId xmlns:p14="http://schemas.microsoft.com/office/powerpoint/2010/main" val="2503517104"/>
       </p:ext>
     </p:extLst>
   </p:cSld>
@@ -7563,110 +9681,40 @@
           <a:chExt cx="0" cy="0"/>
         </a:xfrm>
       </p:grpSpPr>
-      <p:sp>
-        <p:nvSpPr>
-          <p:cNvPr id="2" name="Rectangle 1"/>
-          <p:cNvSpPr/>
+      <p:pic>
+        <p:nvPicPr>
+          <p:cNvPr id="2" name="Picture 1">
+            <a:extLst>
+              <a:ext uri="{FF2B5EF4-FFF2-40B4-BE49-F238E27FC236}">
+                <a16:creationId xmlns:a16="http://schemas.microsoft.com/office/drawing/2014/main" id="{B7F84CF3-60B7-4AC0-9ECA-131AE8996B2C}"/>
+              </a:ext>
+            </a:extLst>
+          </p:cNvPr>
+          <p:cNvPicPr>
+            <a:picLocks noChangeAspect="1"/>
+          </p:cNvPicPr>
           <p:nvPr/>
-        </p:nvSpPr>
+        </p:nvPicPr>
+        <p:blipFill>
+          <a:blip r:embed="rId3"/>
+          <a:stretch>
+            <a:fillRect/>
+          </a:stretch>
+        </p:blipFill>
         <p:spPr>
           <a:xfrm>
-            <a:off x="1064014" y="3127733"/>
-            <a:ext cx="9685665" cy="923330"/>
+            <a:off x="1169831" y="0"/>
+            <a:ext cx="9852338" cy="6858000"/>
           </a:xfrm>
           <a:prstGeom prst="rect">
             <a:avLst/>
           </a:prstGeom>
         </p:spPr>
-        <p:txBody>
-          <a:bodyPr wrap="none">
-            <a:spAutoFit/>
-          </a:bodyPr>
-          <a:lstStyle/>
-          <a:p>
-            <a:r>
-              <a:rPr lang="en-US" sz="3600" dirty="0">
-                <a:solidFill>
-                  <a:schemeClr val="tx2"/>
-                </a:solidFill>
-                <a:latin typeface="Yanone Kaffeesatz Regular" panose="02000000000000000000" pitchFamily="2" charset="0"/>
-              </a:rPr>
-              <a:t>github.com/</a:t>
-            </a:r>
-            <a:r>
-              <a:rPr lang="en-US" sz="3600" dirty="0" err="1">
-                <a:solidFill>
-                  <a:schemeClr val="tx2"/>
-                </a:solidFill>
-                <a:latin typeface="Yanone Kaffeesatz Regular" panose="02000000000000000000" pitchFamily="2" charset="0"/>
-              </a:rPr>
-              <a:t>danielmarbach</a:t>
-            </a:r>
-            <a:r>
-              <a:rPr lang="en-US" sz="3600" dirty="0">
-                <a:solidFill>
-                  <a:schemeClr val="tx2"/>
-                </a:solidFill>
-                <a:latin typeface="Yanone Kaffeesatz Regular" panose="02000000000000000000" pitchFamily="2" charset="0"/>
-              </a:rPr>
-              <a:t>/</a:t>
-            </a:r>
-            <a:r>
-              <a:rPr lang="en-US" sz="5400" dirty="0" err="1">
-                <a:solidFill>
-                  <a:schemeClr val="accent4"/>
-                </a:solidFill>
-                <a:latin typeface="Yanone Kaffeesatz Regular" panose="02000000000000000000" pitchFamily="2" charset="0"/>
-              </a:rPr>
-              <a:t>AzureServiceBus.DeepDive</a:t>
-            </a:r>
-            <a:endParaRPr lang="de-CH" sz="5400" dirty="0">
-              <a:solidFill>
-                <a:schemeClr val="accent4"/>
-              </a:solidFill>
-              <a:latin typeface="Yanone Kaffeesatz Regular" panose="02000000000000000000" pitchFamily="2" charset="0"/>
-            </a:endParaRPr>
-          </a:p>
-        </p:txBody>
-      </p:sp>
-      <p:sp>
-        <p:nvSpPr>
-          <p:cNvPr id="4" name="Rectangle 3"/>
-          <p:cNvSpPr/>
-          <p:nvPr/>
-        </p:nvSpPr>
-        <p:spPr>
-          <a:xfrm>
-            <a:off x="1064014" y="1124536"/>
-            <a:ext cx="6463629" cy="1862048"/>
-          </a:xfrm>
-          <a:prstGeom prst="rect">
-            <a:avLst/>
-          </a:prstGeom>
-        </p:spPr>
-        <p:txBody>
-          <a:bodyPr wrap="none">
-            <a:spAutoFit/>
-          </a:bodyPr>
-          <a:lstStyle/>
-          <a:p>
-            <a:r>
-              <a:rPr lang="en-US" sz="11500" dirty="0">
-                <a:solidFill>
-                  <a:schemeClr val="accent2"/>
-                </a:solidFill>
-                <a:latin typeface="Yanone Kaffeesatz Regular" panose="02000000000000000000" pitchFamily="2" charset="0"/>
-              </a:rPr>
-              <a:t>Slides, Links…</a:t>
-            </a:r>
-            <a:endParaRPr lang="de-CH" sz="1400" dirty="0"/>
-          </a:p>
-        </p:txBody>
-      </p:sp>
+      </p:pic>
     </p:spTree>
     <p:extLst>
       <p:ext uri="{BB962C8B-B14F-4D97-AF65-F5344CB8AC3E}">
-        <p14:creationId xmlns:p14="http://schemas.microsoft.com/office/powerpoint/2010/main" val="1581449120"/>
+        <p14:creationId xmlns:p14="http://schemas.microsoft.com/office/powerpoint/2010/main" val="3509871313"/>
       </p:ext>
     </p:extLst>
   </p:cSld>
@@ -7693,80 +9741,486 @@
           <a:chExt cx="0" cy="0"/>
         </a:xfrm>
       </p:grpSpPr>
-      <p:sp>
-        <p:nvSpPr>
-          <p:cNvPr id="2" name="Rectangle 1"/>
-          <p:cNvSpPr/>
-          <p:nvPr/>
-        </p:nvSpPr>
-        <p:spPr>
-          <a:xfrm>
-            <a:off x="3858849" y="1851645"/>
-            <a:ext cx="4474302" cy="3154710"/>
-          </a:xfrm>
-          <a:prstGeom prst="rect">
-            <a:avLst/>
-          </a:prstGeom>
-        </p:spPr>
-        <p:txBody>
-          <a:bodyPr wrap="none">
-            <a:spAutoFit/>
-          </a:bodyPr>
-          <a:lstStyle/>
-          <a:p>
-            <a:r>
-              <a:rPr lang="en-US" sz="19900" dirty="0">
-                <a:solidFill>
-                  <a:schemeClr val="accent2"/>
-                </a:solidFill>
-                <a:latin typeface="Yanone Kaffeesatz Regular" panose="02000000000000000000" pitchFamily="2" charset="0"/>
-              </a:rPr>
-              <a:t>Q &amp; A</a:t>
-            </a:r>
-            <a:endParaRPr lang="de-CH" sz="2000" dirty="0"/>
-          </a:p>
-        </p:txBody>
-      </p:sp>
       <p:pic>
         <p:nvPicPr>
-          <p:cNvPr id="4" name="Picture 3"/>
+          <p:cNvPr id="2" name="Picture 1">
+            <a:extLst>
+              <a:ext uri="{FF2B5EF4-FFF2-40B4-BE49-F238E27FC236}">
+                <a16:creationId xmlns:a16="http://schemas.microsoft.com/office/drawing/2014/main" id="{54275BE7-AD12-425C-A833-09FBF4D4C0DF}"/>
+              </a:ext>
+            </a:extLst>
+          </p:cNvPr>
           <p:cNvPicPr>
             <a:picLocks noChangeAspect="1"/>
           </p:cNvPicPr>
           <p:nvPr/>
         </p:nvPicPr>
         <p:blipFill>
-          <a:blip r:embed="rId3" cstate="print">
+          <a:blip r:embed="rId3"/>
+          <a:stretch>
+            <a:fillRect/>
+          </a:stretch>
+        </p:blipFill>
+        <p:spPr>
+          <a:xfrm>
+            <a:off x="647420" y="1291536"/>
+            <a:ext cx="10897160" cy="1435174"/>
+          </a:xfrm>
+          <a:prstGeom prst="rect">
+            <a:avLst/>
+          </a:prstGeom>
+        </p:spPr>
+        <p:style>
+          <a:lnRef idx="2">
+            <a:schemeClr val="accent3"/>
+          </a:lnRef>
+          <a:fillRef idx="1">
+            <a:schemeClr val="lt1"/>
+          </a:fillRef>
+          <a:effectRef idx="0">
+            <a:schemeClr val="accent3"/>
+          </a:effectRef>
+          <a:fontRef idx="minor">
+            <a:schemeClr val="dk1"/>
+          </a:fontRef>
+        </p:style>
+      </p:pic>
+      <p:pic>
+        <p:nvPicPr>
+          <p:cNvPr id="4" name="Picture 3">
+            <a:extLst>
+              <a:ext uri="{FF2B5EF4-FFF2-40B4-BE49-F238E27FC236}">
+                <a16:creationId xmlns:a16="http://schemas.microsoft.com/office/drawing/2014/main" id="{AD358E59-4356-47FF-9C37-0BE324AD6913}"/>
+              </a:ext>
+            </a:extLst>
+          </p:cNvPr>
+          <p:cNvPicPr>
+            <a:picLocks noChangeAspect="1"/>
+          </p:cNvPicPr>
+          <p:nvPr/>
+        </p:nvPicPr>
+        <p:blipFill>
+          <a:blip r:embed="rId4"/>
+          <a:stretch>
+            <a:fillRect/>
+          </a:stretch>
+        </p:blipFill>
+        <p:spPr>
+          <a:xfrm>
+            <a:off x="828404" y="4019576"/>
+            <a:ext cx="10535191" cy="1111307"/>
+          </a:xfrm>
+          <a:prstGeom prst="rect">
+            <a:avLst/>
+          </a:prstGeom>
+        </p:spPr>
+        <p:style>
+          <a:lnRef idx="2">
+            <a:schemeClr val="accent3"/>
+          </a:lnRef>
+          <a:fillRef idx="1">
+            <a:schemeClr val="lt1"/>
+          </a:fillRef>
+          <a:effectRef idx="0">
+            <a:schemeClr val="accent3"/>
+          </a:effectRef>
+          <a:fontRef idx="minor">
+            <a:schemeClr val="dk1"/>
+          </a:fontRef>
+        </p:style>
+      </p:pic>
+      <p:sp>
+        <p:nvSpPr>
+          <p:cNvPr id="6" name="Oval 5">
+            <a:extLst>
+              <a:ext uri="{FF2B5EF4-FFF2-40B4-BE49-F238E27FC236}">
+                <a16:creationId xmlns:a16="http://schemas.microsoft.com/office/drawing/2014/main" id="{7224F07F-0BA3-4FDF-95A2-313170E3F416}"/>
+              </a:ext>
+            </a:extLst>
+          </p:cNvPr>
+          <p:cNvSpPr/>
+          <p:nvPr/>
+        </p:nvSpPr>
+        <p:spPr>
+          <a:xfrm>
+            <a:off x="141987" y="1821699"/>
+            <a:ext cx="380527" cy="374847"/>
+          </a:xfrm>
+          <a:prstGeom prst="ellipse">
+            <a:avLst/>
+          </a:prstGeom>
+        </p:spPr>
+        <p:style>
+          <a:lnRef idx="2">
+            <a:schemeClr val="accent3"/>
+          </a:lnRef>
+          <a:fillRef idx="1">
+            <a:schemeClr val="lt1"/>
+          </a:fillRef>
+          <a:effectRef idx="0">
+            <a:schemeClr val="accent3"/>
+          </a:effectRef>
+          <a:fontRef idx="minor">
+            <a:schemeClr val="dk1"/>
+          </a:fontRef>
+        </p:style>
+        <p:txBody>
+          <a:bodyPr rtlCol="0" anchor="ctr"/>
+          <a:lstStyle/>
+          <a:p>
+            <a:pPr algn="ctr"/>
+            <a:r>
+              <a:rPr lang="en-CA" sz="2800" b="1" dirty="0">
+                <a:solidFill>
+                  <a:schemeClr val="bg1">
+                    <a:lumMod val="50000"/>
+                  </a:schemeClr>
+                </a:solidFill>
+              </a:rPr>
+              <a:t>1</a:t>
+            </a:r>
+            <a:endParaRPr lang="en-CA" b="1" dirty="0">
+              <a:solidFill>
+                <a:schemeClr val="bg1">
+                  <a:lumMod val="50000"/>
+                </a:schemeClr>
+              </a:solidFill>
+            </a:endParaRPr>
+          </a:p>
+        </p:txBody>
+      </p:sp>
+      <p:sp>
+        <p:nvSpPr>
+          <p:cNvPr id="7" name="Oval 6">
+            <a:extLst>
+              <a:ext uri="{FF2B5EF4-FFF2-40B4-BE49-F238E27FC236}">
+                <a16:creationId xmlns:a16="http://schemas.microsoft.com/office/drawing/2014/main" id="{04919381-26B5-404B-96BA-0BB8505A764C}"/>
+              </a:ext>
+            </a:extLst>
+          </p:cNvPr>
+          <p:cNvSpPr/>
+          <p:nvPr/>
+        </p:nvSpPr>
+        <p:spPr>
+          <a:xfrm>
+            <a:off x="141987" y="4387805"/>
+            <a:ext cx="380527" cy="374847"/>
+          </a:xfrm>
+          <a:prstGeom prst="ellipse">
+            <a:avLst/>
+          </a:prstGeom>
+        </p:spPr>
+        <p:style>
+          <a:lnRef idx="2">
+            <a:schemeClr val="accent3"/>
+          </a:lnRef>
+          <a:fillRef idx="1">
+            <a:schemeClr val="lt1"/>
+          </a:fillRef>
+          <a:effectRef idx="0">
+            <a:schemeClr val="accent3"/>
+          </a:effectRef>
+          <a:fontRef idx="minor">
+            <a:schemeClr val="dk1"/>
+          </a:fontRef>
+        </p:style>
+        <p:txBody>
+          <a:bodyPr rtlCol="0" anchor="ctr"/>
+          <a:lstStyle/>
+          <a:p>
+            <a:pPr algn="ctr"/>
+            <a:r>
+              <a:rPr lang="en-CA" sz="2800" b="1" dirty="0">
+                <a:solidFill>
+                  <a:schemeClr val="bg1">
+                    <a:lumMod val="50000"/>
+                  </a:schemeClr>
+                </a:solidFill>
+              </a:rPr>
+              <a:t>2</a:t>
+            </a:r>
+            <a:endParaRPr lang="en-CA" b="1" dirty="0">
+              <a:solidFill>
+                <a:schemeClr val="bg1">
+                  <a:lumMod val="50000"/>
+                </a:schemeClr>
+              </a:solidFill>
+            </a:endParaRPr>
+          </a:p>
+        </p:txBody>
+      </p:sp>
+      <p:pic>
+        <p:nvPicPr>
+          <p:cNvPr id="15362" name="Picture 2" descr="File:But-why-meme-generator-but-why-84103d.jpg">
+            <a:extLst>
+              <a:ext uri="{FF2B5EF4-FFF2-40B4-BE49-F238E27FC236}">
+                <a16:creationId xmlns:a16="http://schemas.microsoft.com/office/drawing/2014/main" id="{3C6EBFE1-B372-4AE4-998B-D46D4EEE3DA5}"/>
+              </a:ext>
+            </a:extLst>
+          </p:cNvPr>
+          <p:cNvPicPr>
+            <a:picLocks noChangeAspect="1" noChangeArrowheads="1"/>
+          </p:cNvPicPr>
+          <p:nvPr/>
+        </p:nvPicPr>
+        <p:blipFill>
+          <a:blip r:embed="rId5">
             <a:extLst>
               <a:ext uri="{28A0092B-C50C-407E-A947-70E740481C1C}">
                 <a14:useLocalDpi xmlns:a14="http://schemas.microsoft.com/office/drawing/2010/main" val="0"/>
               </a:ext>
             </a:extLst>
           </a:blip>
+          <a:srcRect/>
           <a:stretch>
             <a:fillRect/>
           </a:stretch>
         </p:blipFill>
-        <p:spPr>
+        <p:spPr bwMode="auto">
           <a:xfrm>
-            <a:off x="8052306" y="612519"/>
-            <a:ext cx="2880000" cy="690817"/>
+            <a:off x="2002447" y="1216270"/>
+            <a:ext cx="7562321" cy="3914613"/>
           </a:xfrm>
           <a:prstGeom prst="rect">
             <a:avLst/>
           </a:prstGeom>
+          <a:noFill/>
+          <a:extLst>
+            <a:ext uri="{909E8E84-426E-40DD-AFC4-6F175D3DCCD1}">
+              <a14:hiddenFill xmlns:a14="http://schemas.microsoft.com/office/drawing/2010/main">
+                <a:solidFill>
+                  <a:srgbClr val="FFFFFF"/>
+                </a:solidFill>
+              </a14:hiddenFill>
+            </a:ext>
+          </a:extLst>
         </p:spPr>
       </p:pic>
+      <p:cxnSp>
+        <p:nvCxnSpPr>
+          <p:cNvPr id="8" name="Straight Connector 7">
+            <a:extLst>
+              <a:ext uri="{FF2B5EF4-FFF2-40B4-BE49-F238E27FC236}">
+                <a16:creationId xmlns:a16="http://schemas.microsoft.com/office/drawing/2014/main" id="{F0752EAC-7284-4E61-BABF-82C3847F7F77}"/>
+              </a:ext>
+            </a:extLst>
+          </p:cNvPr>
+          <p:cNvCxnSpPr/>
+          <p:nvPr/>
+        </p:nvCxnSpPr>
+        <p:spPr>
+          <a:xfrm>
+            <a:off x="2448232" y="4843370"/>
+            <a:ext cx="979293" cy="0"/>
+          </a:xfrm>
+          <a:prstGeom prst="line">
+            <a:avLst/>
+          </a:prstGeom>
+          <a:ln w="57150">
+            <a:solidFill>
+              <a:srgbClr val="C00000"/>
+            </a:solidFill>
+          </a:ln>
+        </p:spPr>
+        <p:style>
+          <a:lnRef idx="1">
+            <a:schemeClr val="accent1"/>
+          </a:lnRef>
+          <a:fillRef idx="0">
+            <a:schemeClr val="accent1"/>
+          </a:fillRef>
+          <a:effectRef idx="0">
+            <a:schemeClr val="accent1"/>
+          </a:effectRef>
+          <a:fontRef idx="minor">
+            <a:schemeClr val="tx1"/>
+          </a:fontRef>
+        </p:style>
+      </p:cxnSp>
     </p:spTree>
     <p:extLst>
       <p:ext uri="{BB962C8B-B14F-4D97-AF65-F5344CB8AC3E}">
-        <p14:creationId xmlns:p14="http://schemas.microsoft.com/office/powerpoint/2010/main" val="4241321608"/>
+        <p14:creationId xmlns:p14="http://schemas.microsoft.com/office/powerpoint/2010/main" val="4279211630"/>
       </p:ext>
     </p:extLst>
   </p:cSld>
   <p:clrMapOvr>
     <a:masterClrMapping/>
   </p:clrMapOvr>
+  <p:timing>
+    <p:tnLst>
+      <p:par>
+        <p:cTn id="1" dur="indefinite" restart="never" nodeType="tmRoot">
+          <p:childTnLst>
+            <p:seq concurrent="1" nextAc="seek">
+              <p:cTn id="2" dur="indefinite" nodeType="mainSeq">
+                <p:childTnLst>
+                  <p:par>
+                    <p:cTn id="3" fill="hold">
+                      <p:stCondLst>
+                        <p:cond delay="indefinite"/>
+                      </p:stCondLst>
+                      <p:childTnLst>
+                        <p:par>
+                          <p:cTn id="4" fill="hold">
+                            <p:stCondLst>
+                              <p:cond delay="0"/>
+                            </p:stCondLst>
+                            <p:childTnLst>
+                              <p:par>
+                                <p:cTn id="5" presetID="1" presetClass="entr" presetSubtype="0" fill="hold" nodeType="clickEffect">
+                                  <p:stCondLst>
+                                    <p:cond delay="0"/>
+                                  </p:stCondLst>
+                                  <p:childTnLst>
+                                    <p:set>
+                                      <p:cBhvr>
+                                        <p:cTn id="6" dur="1" fill="hold">
+                                          <p:stCondLst>
+                                            <p:cond delay="0"/>
+                                          </p:stCondLst>
+                                        </p:cTn>
+                                        <p:tgtEl>
+                                          <p:spTgt spid="8"/>
+                                        </p:tgtEl>
+                                        <p:attrNameLst>
+                                          <p:attrName>style.visibility</p:attrName>
+                                        </p:attrNameLst>
+                                      </p:cBhvr>
+                                      <p:to>
+                                        <p:strVal val="visible"/>
+                                      </p:to>
+                                    </p:set>
+                                  </p:childTnLst>
+                                </p:cTn>
+                              </p:par>
+                            </p:childTnLst>
+                          </p:cTn>
+                        </p:par>
+                      </p:childTnLst>
+                    </p:cTn>
+                  </p:par>
+                  <p:par>
+                    <p:cTn id="7" fill="hold">
+                      <p:stCondLst>
+                        <p:cond delay="indefinite"/>
+                      </p:stCondLst>
+                      <p:childTnLst>
+                        <p:par>
+                          <p:cTn id="8" fill="hold">
+                            <p:stCondLst>
+                              <p:cond delay="0"/>
+                            </p:stCondLst>
+                            <p:childTnLst>
+                              <p:par>
+                                <p:cTn id="9" presetID="53" presetClass="entr" presetSubtype="16" fill="hold" nodeType="clickEffect">
+                                  <p:stCondLst>
+                                    <p:cond delay="0"/>
+                                  </p:stCondLst>
+                                  <p:childTnLst>
+                                    <p:set>
+                                      <p:cBhvr>
+                                        <p:cTn id="10" dur="1" fill="hold">
+                                          <p:stCondLst>
+                                            <p:cond delay="0"/>
+                                          </p:stCondLst>
+                                        </p:cTn>
+                                        <p:tgtEl>
+                                          <p:spTgt spid="15362"/>
+                                        </p:tgtEl>
+                                        <p:attrNameLst>
+                                          <p:attrName>style.visibility</p:attrName>
+                                        </p:attrNameLst>
+                                      </p:cBhvr>
+                                      <p:to>
+                                        <p:strVal val="visible"/>
+                                      </p:to>
+                                    </p:set>
+                                    <p:anim calcmode="lin" valueType="num">
+                                      <p:cBhvr>
+                                        <p:cTn id="11" dur="500" fill="hold"/>
+                                        <p:tgtEl>
+                                          <p:spTgt spid="15362"/>
+                                        </p:tgtEl>
+                                        <p:attrNameLst>
+                                          <p:attrName>ppt_w</p:attrName>
+                                        </p:attrNameLst>
+                                      </p:cBhvr>
+                                      <p:tavLst>
+                                        <p:tav tm="0">
+                                          <p:val>
+                                            <p:fltVal val="0"/>
+                                          </p:val>
+                                        </p:tav>
+                                        <p:tav tm="100000">
+                                          <p:val>
+                                            <p:strVal val="#ppt_w"/>
+                                          </p:val>
+                                        </p:tav>
+                                      </p:tavLst>
+                                    </p:anim>
+                                    <p:anim calcmode="lin" valueType="num">
+                                      <p:cBhvr>
+                                        <p:cTn id="12" dur="500" fill="hold"/>
+                                        <p:tgtEl>
+                                          <p:spTgt spid="15362"/>
+                                        </p:tgtEl>
+                                        <p:attrNameLst>
+                                          <p:attrName>ppt_h</p:attrName>
+                                        </p:attrNameLst>
+                                      </p:cBhvr>
+                                      <p:tavLst>
+                                        <p:tav tm="0">
+                                          <p:val>
+                                            <p:fltVal val="0"/>
+                                          </p:val>
+                                        </p:tav>
+                                        <p:tav tm="100000">
+                                          <p:val>
+                                            <p:strVal val="#ppt_h"/>
+                                          </p:val>
+                                        </p:tav>
+                                      </p:tavLst>
+                                    </p:anim>
+                                    <p:animEffect transition="in" filter="fade">
+                                      <p:cBhvr>
+                                        <p:cTn id="13" dur="500"/>
+                                        <p:tgtEl>
+                                          <p:spTgt spid="15362"/>
+                                        </p:tgtEl>
+                                      </p:cBhvr>
+                                    </p:animEffect>
+                                  </p:childTnLst>
+                                </p:cTn>
+                              </p:par>
+                            </p:childTnLst>
+                          </p:cTn>
+                        </p:par>
+                      </p:childTnLst>
+                    </p:cTn>
+                  </p:par>
+                </p:childTnLst>
+              </p:cTn>
+              <p:prevCondLst>
+                <p:cond evt="onPrev" delay="0">
+                  <p:tgtEl>
+                    <p:sldTgt/>
+                  </p:tgtEl>
+                </p:cond>
+              </p:prevCondLst>
+              <p:nextCondLst>
+                <p:cond evt="onNext" delay="0">
+                  <p:tgtEl>
+                    <p:sldTgt/>
+                  </p:tgtEl>
+                </p:cond>
+              </p:nextCondLst>
+            </p:seq>
+          </p:childTnLst>
+        </p:cTn>
+      </p:par>
+    </p:tnLst>
+  </p:timing>
 </p:sld>
 </file>
 
@@ -7789,14 +10243,20 @@
       </p:grpSpPr>
       <p:pic>
         <p:nvPicPr>
-          <p:cNvPr id="3" name="Picture 2"/>
+          <p:cNvPr id="6" name="Picture 5">
+            <a:extLst>
+              <a:ext uri="{FF2B5EF4-FFF2-40B4-BE49-F238E27FC236}">
+                <a16:creationId xmlns:a16="http://schemas.microsoft.com/office/drawing/2014/main" id="{E3721C01-DE9B-4972-B0A3-C43E74523A7C}"/>
+              </a:ext>
+            </a:extLst>
+          </p:cNvPr>
           <p:cNvPicPr>
             <a:picLocks noChangeAspect="1"/>
           </p:cNvPicPr>
           <p:nvPr/>
         </p:nvPicPr>
         <p:blipFill>
-          <a:blip r:embed="rId3" cstate="print">
+          <a:blip r:embed="rId3">
             <a:extLst>
               <a:ext uri="{28A0092B-C50C-407E-A947-70E740481C1C}">
                 <a14:useLocalDpi xmlns:a14="http://schemas.microsoft.com/office/drawing/2010/main" val="0"/>
@@ -7809,109 +10269,30 @@
         </p:blipFill>
         <p:spPr>
           <a:xfrm>
-            <a:off x="8052306" y="612519"/>
-            <a:ext cx="2880000" cy="690817"/>
+            <a:off x="2198542" y="3110998"/>
+            <a:ext cx="2143125" cy="2143125"/>
           </a:xfrm>
           <a:prstGeom prst="rect">
             <a:avLst/>
           </a:prstGeom>
         </p:spPr>
       </p:pic>
-      <p:sp>
-        <p:nvSpPr>
-          <p:cNvPr id="2" name="Rectangle 1"/>
-          <p:cNvSpPr/>
-          <p:nvPr/>
-        </p:nvSpPr>
-        <p:spPr>
-          <a:xfrm>
-            <a:off x="5723694" y="2090172"/>
-            <a:ext cx="6096000" cy="2677656"/>
-          </a:xfrm>
-          <a:prstGeom prst="rect">
-            <a:avLst/>
-          </a:prstGeom>
-        </p:spPr>
-        <p:txBody>
-          <a:bodyPr>
-            <a:spAutoFit/>
-          </a:bodyPr>
-          <a:lstStyle/>
-          <a:p>
-            <a:r>
-              <a:rPr lang="en-US" sz="2800" dirty="0">
-                <a:solidFill>
-                  <a:schemeClr val="tx2"/>
-                </a:solidFill>
-                <a:latin typeface="Yanone Kaffeesatz Regular" panose="02000000000000000000" pitchFamily="2" charset="0"/>
-              </a:rPr>
-              <a:t>Software Engineer</a:t>
-            </a:r>
-          </a:p>
-          <a:p>
-            <a:r>
-              <a:rPr lang="en-US" sz="2800" dirty="0">
-                <a:solidFill>
-                  <a:schemeClr val="tx2"/>
-                </a:solidFill>
-                <a:latin typeface="Yanone Kaffeesatz Regular" panose="02000000000000000000" pitchFamily="2" charset="0"/>
-              </a:rPr>
-              <a:t>Microsoft MVP</a:t>
-            </a:r>
-          </a:p>
-          <a:p>
-            <a:endParaRPr lang="en-US" sz="2800" dirty="0">
-              <a:solidFill>
-                <a:schemeClr val="tx2"/>
-              </a:solidFill>
-              <a:latin typeface="Yanone Kaffeesatz Regular" panose="02000000000000000000" pitchFamily="2" charset="0"/>
-            </a:endParaRPr>
-          </a:p>
-          <a:p>
-            <a:r>
-              <a:rPr lang="en-US" sz="2800" dirty="0">
-                <a:solidFill>
-                  <a:schemeClr val="accent4"/>
-                </a:solidFill>
-                <a:latin typeface="Yanone Kaffeesatz Regular" panose="02000000000000000000" pitchFamily="2" charset="0"/>
-              </a:rPr>
-              <a:t>@danielmarbach</a:t>
-            </a:r>
-          </a:p>
-          <a:p>
-            <a:r>
-              <a:rPr lang="en-US" sz="2800" dirty="0">
-                <a:solidFill>
-                  <a:schemeClr val="accent4"/>
-                </a:solidFill>
-                <a:latin typeface="Yanone Kaffeesatz Regular" panose="02000000000000000000" pitchFamily="2" charset="0"/>
-              </a:rPr>
-              <a:t>particular.net/blog</a:t>
-            </a:r>
-          </a:p>
-          <a:p>
-            <a:r>
-              <a:rPr lang="en-US" sz="2800" dirty="0">
-                <a:solidFill>
-                  <a:schemeClr val="accent4"/>
-                </a:solidFill>
-                <a:latin typeface="Yanone Kaffeesatz Regular" panose="02000000000000000000" pitchFamily="2" charset="0"/>
-              </a:rPr>
-              <a:t>planetgeek.ch</a:t>
-            </a:r>
-          </a:p>
-        </p:txBody>
-      </p:sp>
       <p:pic>
         <p:nvPicPr>
-          <p:cNvPr id="6" name="Picture 5"/>
+          <p:cNvPr id="9" name="Picture 8">
+            <a:extLst>
+              <a:ext uri="{FF2B5EF4-FFF2-40B4-BE49-F238E27FC236}">
+                <a16:creationId xmlns:a16="http://schemas.microsoft.com/office/drawing/2014/main" id="{BFEA759B-20CA-4652-B153-CF641615214A}"/>
+              </a:ext>
+            </a:extLst>
+          </p:cNvPr>
           <p:cNvPicPr>
             <a:picLocks noChangeAspect="1"/>
           </p:cNvPicPr>
           <p:nvPr/>
         </p:nvPicPr>
         <p:blipFill>
-          <a:blip r:embed="rId4" cstate="print">
+          <a:blip r:embed="rId4">
             <a:extLst>
               <a:ext uri="{28A0092B-C50C-407E-A947-70E740481C1C}">
                 <a14:useLocalDpi xmlns:a14="http://schemas.microsoft.com/office/drawing/2010/main" val="0"/>
@@ -7924,24 +10305,369 @@
         </p:blipFill>
         <p:spPr>
           <a:xfrm>
-            <a:off x="1852348" y="1768017"/>
-            <a:ext cx="2558625" cy="3837938"/>
+            <a:off x="7326900" y="3112811"/>
+            <a:ext cx="3189990" cy="2141312"/>
           </a:xfrm>
           <a:prstGeom prst="rect">
             <a:avLst/>
           </a:prstGeom>
         </p:spPr>
       </p:pic>
+      <p:pic>
+        <p:nvPicPr>
+          <p:cNvPr id="11" name="Picture 10">
+            <a:extLst>
+              <a:ext uri="{FF2B5EF4-FFF2-40B4-BE49-F238E27FC236}">
+                <a16:creationId xmlns:a16="http://schemas.microsoft.com/office/drawing/2014/main" id="{56F4A560-C1BA-4B37-B4A8-F725F6B0D335}"/>
+              </a:ext>
+            </a:extLst>
+          </p:cNvPr>
+          <p:cNvPicPr>
+            <a:picLocks noChangeAspect="1"/>
+          </p:cNvPicPr>
+          <p:nvPr/>
+        </p:nvPicPr>
+        <p:blipFill>
+          <a:blip r:embed="rId5"/>
+          <a:stretch>
+            <a:fillRect/>
+          </a:stretch>
+        </p:blipFill>
+        <p:spPr>
+          <a:xfrm>
+            <a:off x="3270105" y="963019"/>
+            <a:ext cx="5651790" cy="1955901"/>
+          </a:xfrm>
+          <a:prstGeom prst="rect">
+            <a:avLst/>
+          </a:prstGeom>
+        </p:spPr>
+      </p:pic>
+      <p:sp>
+        <p:nvSpPr>
+          <p:cNvPr id="12" name="TextBox 11">
+            <a:extLst>
+              <a:ext uri="{FF2B5EF4-FFF2-40B4-BE49-F238E27FC236}">
+                <a16:creationId xmlns:a16="http://schemas.microsoft.com/office/drawing/2014/main" id="{C1ED6AE7-0AF0-43C6-A7F9-FCC9A80DC7F5}"/>
+              </a:ext>
+            </a:extLst>
+          </p:cNvPr>
+          <p:cNvSpPr txBox="1"/>
+          <p:nvPr/>
+        </p:nvSpPr>
+        <p:spPr>
+          <a:xfrm>
+            <a:off x="2073019" y="5401208"/>
+            <a:ext cx="2731841" cy="369332"/>
+          </a:xfrm>
+          <a:prstGeom prst="rect">
+            <a:avLst/>
+          </a:prstGeom>
+          <a:noFill/>
+        </p:spPr>
+        <p:txBody>
+          <a:bodyPr wrap="square" rtlCol="0">
+            <a:spAutoFit/>
+          </a:bodyPr>
+          <a:lstStyle/>
+          <a:p>
+            <a:r>
+              <a:rPr lang="en-CA" b="1" dirty="0" err="1">
+                <a:solidFill>
+                  <a:srgbClr val="004880"/>
+                </a:solidFill>
+              </a:rPr>
+              <a:t>WindowsAzure.ServiceBus</a:t>
+            </a:r>
+            <a:endParaRPr lang="en-CA" b="1" dirty="0">
+              <a:solidFill>
+                <a:srgbClr val="004880"/>
+              </a:solidFill>
+            </a:endParaRPr>
+          </a:p>
+        </p:txBody>
+      </p:sp>
+      <p:sp>
+        <p:nvSpPr>
+          <p:cNvPr id="13" name="TextBox 12">
+            <a:extLst>
+              <a:ext uri="{FF2B5EF4-FFF2-40B4-BE49-F238E27FC236}">
+                <a16:creationId xmlns:a16="http://schemas.microsoft.com/office/drawing/2014/main" id="{D1B8248B-13E8-441A-9702-00703E94B3B8}"/>
+              </a:ext>
+            </a:extLst>
+          </p:cNvPr>
+          <p:cNvSpPr txBox="1"/>
+          <p:nvPr/>
+        </p:nvSpPr>
+        <p:spPr>
+          <a:xfrm>
+            <a:off x="4646779" y="520145"/>
+            <a:ext cx="2898441" cy="461665"/>
+          </a:xfrm>
+          <a:prstGeom prst="rect">
+            <a:avLst/>
+          </a:prstGeom>
+          <a:noFill/>
+        </p:spPr>
+        <p:txBody>
+          <a:bodyPr wrap="square" rtlCol="0">
+            <a:spAutoFit/>
+          </a:bodyPr>
+          <a:lstStyle/>
+          <a:p>
+            <a:r>
+              <a:rPr lang="en-CA" sz="2400" b="1" dirty="0" err="1">
+                <a:solidFill>
+                  <a:srgbClr val="004880"/>
+                </a:solidFill>
+                <a:latin typeface="Yanone Kaffeesatz Regular" panose="02000000000000000000" pitchFamily="2" charset="0"/>
+              </a:rPr>
+              <a:t>Microsoft.Azure.ServiceBus</a:t>
+            </a:r>
+            <a:endParaRPr lang="en-CA" sz="2400" b="1" dirty="0">
+              <a:solidFill>
+                <a:srgbClr val="004880"/>
+              </a:solidFill>
+              <a:latin typeface="Yanone Kaffeesatz Regular" panose="02000000000000000000" pitchFamily="2" charset="0"/>
+            </a:endParaRPr>
+          </a:p>
+        </p:txBody>
+      </p:sp>
+      <p:pic>
+        <p:nvPicPr>
+          <p:cNvPr id="1026" name="Picture 2" descr="Image result for microsoft loves oss">
+            <a:extLst>
+              <a:ext uri="{FF2B5EF4-FFF2-40B4-BE49-F238E27FC236}">
+                <a16:creationId xmlns:a16="http://schemas.microsoft.com/office/drawing/2014/main" id="{07D8A092-0D22-4C7D-844E-7FA26A2CECA3}"/>
+              </a:ext>
+            </a:extLst>
+          </p:cNvPr>
+          <p:cNvPicPr>
+            <a:picLocks noChangeAspect="1" noChangeArrowheads="1"/>
+          </p:cNvPicPr>
+          <p:nvPr/>
+        </p:nvPicPr>
+        <p:blipFill>
+          <a:blip r:embed="rId6">
+            <a:extLst>
+              <a:ext uri="{28A0092B-C50C-407E-A947-70E740481C1C}">
+                <a14:useLocalDpi xmlns:a14="http://schemas.microsoft.com/office/drawing/2010/main" val="0"/>
+              </a:ext>
+            </a:extLst>
+          </a:blip>
+          <a:srcRect/>
+          <a:stretch>
+            <a:fillRect/>
+          </a:stretch>
+        </p:blipFill>
+        <p:spPr bwMode="auto">
+          <a:xfrm rot="20245220">
+            <a:off x="-489025" y="448199"/>
+            <a:ext cx="5715000" cy="1066800"/>
+          </a:xfrm>
+          <a:prstGeom prst="rect">
+            <a:avLst/>
+          </a:prstGeom>
+          <a:ln>
+            <a:noFill/>
+          </a:ln>
+          <a:effectLst>
+            <a:outerShdw blurRad="292100" dist="139700" dir="2700000" algn="tl" rotWithShape="0">
+              <a:srgbClr val="333333">
+                <a:alpha val="65000"/>
+              </a:srgbClr>
+            </a:outerShdw>
+          </a:effectLst>
+          <a:extLst>
+            <a:ext uri="{909E8E84-426E-40DD-AFC4-6F175D3DCCD1}">
+              <a14:hiddenFill xmlns:a14="http://schemas.microsoft.com/office/drawing/2010/main">
+                <a:solidFill>
+                  <a:srgbClr val="FFFFFF"/>
+                </a:solidFill>
+              </a14:hiddenFill>
+            </a:ext>
+          </a:extLst>
+        </p:spPr>
+      </p:pic>
     </p:spTree>
     <p:extLst>
       <p:ext uri="{BB962C8B-B14F-4D97-AF65-F5344CB8AC3E}">
-        <p14:creationId xmlns:p14="http://schemas.microsoft.com/office/powerpoint/2010/main" val="3601279917"/>
+        <p14:creationId xmlns:p14="http://schemas.microsoft.com/office/powerpoint/2010/main" val="2742703165"/>
       </p:ext>
     </p:extLst>
   </p:cSld>
   <p:clrMapOvr>
     <a:masterClrMapping/>
   </p:clrMapOvr>
+  <p:timing>
+    <p:tnLst>
+      <p:par>
+        <p:cTn id="1" dur="indefinite" restart="never" nodeType="tmRoot">
+          <p:childTnLst>
+            <p:seq concurrent="1" nextAc="seek">
+              <p:cTn id="2" dur="indefinite" nodeType="mainSeq">
+                <p:childTnLst>
+                  <p:par>
+                    <p:cTn id="3" fill="hold">
+                      <p:stCondLst>
+                        <p:cond delay="indefinite"/>
+                      </p:stCondLst>
+                      <p:childTnLst>
+                        <p:par>
+                          <p:cTn id="4" fill="hold">
+                            <p:stCondLst>
+                              <p:cond delay="0"/>
+                            </p:stCondLst>
+                            <p:childTnLst>
+                              <p:par>
+                                <p:cTn id="5" presetID="1" presetClass="entr" presetSubtype="0" fill="hold" grpId="0" nodeType="clickEffect">
+                                  <p:stCondLst>
+                                    <p:cond delay="0"/>
+                                  </p:stCondLst>
+                                  <p:childTnLst>
+                                    <p:set>
+                                      <p:cBhvr>
+                                        <p:cTn id="6" dur="1" fill="hold">
+                                          <p:stCondLst>
+                                            <p:cond delay="0"/>
+                                          </p:stCondLst>
+                                        </p:cTn>
+                                        <p:tgtEl>
+                                          <p:spTgt spid="12"/>
+                                        </p:tgtEl>
+                                        <p:attrNameLst>
+                                          <p:attrName>style.visibility</p:attrName>
+                                        </p:attrNameLst>
+                                      </p:cBhvr>
+                                      <p:to>
+                                        <p:strVal val="visible"/>
+                                      </p:to>
+                                    </p:set>
+                                  </p:childTnLst>
+                                </p:cTn>
+                              </p:par>
+                            </p:childTnLst>
+                          </p:cTn>
+                        </p:par>
+                      </p:childTnLst>
+                    </p:cTn>
+                  </p:par>
+                  <p:par>
+                    <p:cTn id="7" fill="hold">
+                      <p:stCondLst>
+                        <p:cond delay="indefinite"/>
+                      </p:stCondLst>
+                      <p:childTnLst>
+                        <p:par>
+                          <p:cTn id="8" fill="hold">
+                            <p:stCondLst>
+                              <p:cond delay="0"/>
+                            </p:stCondLst>
+                            <p:childTnLst>
+                              <p:par>
+                                <p:cTn id="9" presetID="1" presetClass="entr" presetSubtype="0" fill="hold" grpId="0" nodeType="clickEffect">
+                                  <p:stCondLst>
+                                    <p:cond delay="0"/>
+                                  </p:stCondLst>
+                                  <p:childTnLst>
+                                    <p:set>
+                                      <p:cBhvr>
+                                        <p:cTn id="10" dur="1" fill="hold">
+                                          <p:stCondLst>
+                                            <p:cond delay="0"/>
+                                          </p:stCondLst>
+                                        </p:cTn>
+                                        <p:tgtEl>
+                                          <p:spTgt spid="13"/>
+                                        </p:tgtEl>
+                                        <p:attrNameLst>
+                                          <p:attrName>style.visibility</p:attrName>
+                                        </p:attrNameLst>
+                                      </p:cBhvr>
+                                      <p:to>
+                                        <p:strVal val="visible"/>
+                                      </p:to>
+                                    </p:set>
+                                  </p:childTnLst>
+                                </p:cTn>
+                              </p:par>
+                            </p:childTnLst>
+                          </p:cTn>
+                        </p:par>
+                      </p:childTnLst>
+                    </p:cTn>
+                  </p:par>
+                  <p:par>
+                    <p:cTn id="11" fill="hold">
+                      <p:stCondLst>
+                        <p:cond delay="indefinite"/>
+                      </p:stCondLst>
+                      <p:childTnLst>
+                        <p:par>
+                          <p:cTn id="12" fill="hold">
+                            <p:stCondLst>
+                              <p:cond delay="0"/>
+                            </p:stCondLst>
+                            <p:childTnLst>
+                              <p:par>
+                                <p:cTn id="13" presetID="1" presetClass="entr" presetSubtype="0" fill="hold" nodeType="clickEffect">
+                                  <p:stCondLst>
+                                    <p:cond delay="0"/>
+                                  </p:stCondLst>
+                                  <p:childTnLst>
+                                    <p:set>
+                                      <p:cBhvr>
+                                        <p:cTn id="14" dur="1" fill="hold">
+                                          <p:stCondLst>
+                                            <p:cond delay="0"/>
+                                          </p:stCondLst>
+                                        </p:cTn>
+                                        <p:tgtEl>
+                                          <p:spTgt spid="1026"/>
+                                        </p:tgtEl>
+                                        <p:attrNameLst>
+                                          <p:attrName>style.visibility</p:attrName>
+                                        </p:attrNameLst>
+                                      </p:cBhvr>
+                                      <p:to>
+                                        <p:strVal val="visible"/>
+                                      </p:to>
+                                    </p:set>
+                                  </p:childTnLst>
+                                </p:cTn>
+                              </p:par>
+                            </p:childTnLst>
+                          </p:cTn>
+                        </p:par>
+                      </p:childTnLst>
+                    </p:cTn>
+                  </p:par>
+                </p:childTnLst>
+              </p:cTn>
+              <p:prevCondLst>
+                <p:cond evt="onPrev" delay="0">
+                  <p:tgtEl>
+                    <p:sldTgt/>
+                  </p:tgtEl>
+                </p:cond>
+              </p:prevCondLst>
+              <p:nextCondLst>
+                <p:cond evt="onNext" delay="0">
+                  <p:tgtEl>
+                    <p:sldTgt/>
+                  </p:tgtEl>
+                </p:cond>
+              </p:nextCondLst>
+            </p:seq>
+          </p:childTnLst>
+        </p:cTn>
+      </p:par>
+    </p:tnLst>
+    <p:bldLst>
+      <p:bldP spid="12" grpId="0"/>
+      <p:bldP spid="13" grpId="0"/>
+    </p:bldLst>
+  </p:timing>
 </p:sld>
 </file>
 
@@ -7962,21 +10688,87 @@
           <a:chExt cx="0" cy="0"/>
         </a:xfrm>
       </p:grpSpPr>
-      <p:sp>
-        <p:nvSpPr>
-          <p:cNvPr id="2" name="Rectangle 1"/>
-          <p:cNvSpPr/>
+      <p:pic>
+        <p:nvPicPr>
+          <p:cNvPr id="2" name="Picture 1">
+            <a:extLst>
+              <a:ext uri="{FF2B5EF4-FFF2-40B4-BE49-F238E27FC236}">
+                <a16:creationId xmlns:a16="http://schemas.microsoft.com/office/drawing/2014/main" id="{49FB2ADA-AB17-49BE-8767-15F49E7E3C89}"/>
+              </a:ext>
+            </a:extLst>
+          </p:cNvPr>
+          <p:cNvPicPr>
+            <a:picLocks noChangeAspect="1"/>
+          </p:cNvPicPr>
           <p:nvPr/>
-        </p:nvSpPr>
+        </p:nvPicPr>
+        <p:blipFill>
+          <a:blip r:embed="rId3"/>
+          <a:stretch>
+            <a:fillRect/>
+          </a:stretch>
+        </p:blipFill>
         <p:spPr>
           <a:xfrm>
-            <a:off x="3176771" y="1851645"/>
-            <a:ext cx="5838458" cy="3154710"/>
+            <a:off x="0" y="341529"/>
+            <a:ext cx="12192000" cy="6174941"/>
           </a:xfrm>
           <a:prstGeom prst="rect">
             <a:avLst/>
           </a:prstGeom>
         </p:spPr>
+      </p:pic>
+    </p:spTree>
+    <p:extLst>
+      <p:ext uri="{BB962C8B-B14F-4D97-AF65-F5344CB8AC3E}">
+        <p14:creationId xmlns:p14="http://schemas.microsoft.com/office/powerpoint/2010/main" val="2140755531"/>
+      </p:ext>
+    </p:extLst>
+  </p:cSld>
+  <p:clrMapOvr>
+    <a:masterClrMapping/>
+  </p:clrMapOvr>
+</p:sld>
+</file>
+
+<file path=ppt/slides/slide9.xml><?xml version="1.0" encoding="utf-8"?>
+<p:sld xmlns:a="http://schemas.openxmlformats.org/drawingml/2006/main" xmlns:r="http://schemas.openxmlformats.org/officeDocument/2006/relationships" xmlns:p="http://schemas.openxmlformats.org/presentationml/2006/main">
+  <p:cSld>
+    <p:spTree>
+      <p:nvGrpSpPr>
+        <p:cNvPr id="1" name=""/>
+        <p:cNvGrpSpPr/>
+        <p:nvPr/>
+      </p:nvGrpSpPr>
+      <p:grpSpPr>
+        <a:xfrm>
+          <a:off x="0" y="0"/>
+          <a:ext cx="0" cy="0"/>
+          <a:chOff x="0" y="0"/>
+          <a:chExt cx="0" cy="0"/>
+        </a:xfrm>
+      </p:grpSpPr>
+      <p:sp>
+        <p:nvSpPr>
+          <p:cNvPr id="2" name="Rectangle 1">
+            <a:extLst>
+              <a:ext uri="{FF2B5EF4-FFF2-40B4-BE49-F238E27FC236}">
+                <a16:creationId xmlns:a16="http://schemas.microsoft.com/office/drawing/2014/main" id="{F66DE266-C764-411A-9473-EBA9CC3DB1E5}"/>
+              </a:ext>
+            </a:extLst>
+          </p:cNvPr>
+          <p:cNvSpPr/>
+          <p:nvPr/>
+        </p:nvSpPr>
+        <p:spPr>
+          <a:xfrm>
+            <a:off x="2735944" y="3598987"/>
+            <a:ext cx="6720109" cy="923330"/>
+          </a:xfrm>
+          <a:prstGeom prst="rect">
+            <a:avLst/>
+          </a:prstGeom>
+        </p:spPr>
         <p:txBody>
           <a:bodyPr wrap="none">
             <a:spAutoFit/>
@@ -7984,23 +10776,61 @@
           <a:lstStyle/>
           <a:p>
             <a:r>
-              <a:rPr lang="en-US" sz="19900" dirty="0">
+              <a:rPr lang="en-US" sz="3600" dirty="0">
                 <a:solidFill>
-                  <a:schemeClr val="accent2"/>
+                  <a:schemeClr val="tx2"/>
                 </a:solidFill>
                 <a:latin typeface="Yanone Kaffeesatz Regular" panose="02000000000000000000" pitchFamily="2" charset="0"/>
               </a:rPr>
-              <a:t>Thanks</a:t>
-            </a:r>
-            <a:endParaRPr lang="de-CH" sz="2000" dirty="0"/>
+              <a:t>github.com/azure/</a:t>
+            </a:r>
+            <a:r>
+              <a:rPr lang="en-US" sz="5400" dirty="0">
+                <a:solidFill>
+                  <a:schemeClr val="accent4"/>
+                </a:solidFill>
+                <a:latin typeface="Yanone Kaffeesatz Regular" panose="02000000000000000000" pitchFamily="2" charset="0"/>
+              </a:rPr>
+              <a:t>azure-</a:t>
+            </a:r>
+            <a:r>
+              <a:rPr lang="en-US" sz="5400" dirty="0" err="1">
+                <a:solidFill>
+                  <a:schemeClr val="accent4"/>
+                </a:solidFill>
+                <a:latin typeface="Yanone Kaffeesatz Regular" panose="02000000000000000000" pitchFamily="2" charset="0"/>
+              </a:rPr>
+              <a:t>sdk</a:t>
+            </a:r>
+            <a:r>
+              <a:rPr lang="en-US" sz="5400" dirty="0">
+                <a:solidFill>
+                  <a:schemeClr val="accent4"/>
+                </a:solidFill>
+                <a:latin typeface="Yanone Kaffeesatz Regular" panose="02000000000000000000" pitchFamily="2" charset="0"/>
+              </a:rPr>
+              <a:t>-for-net</a:t>
+            </a:r>
+            <a:endParaRPr lang="de-CH" sz="5400" dirty="0">
+              <a:solidFill>
+                <a:schemeClr val="accent4"/>
+              </a:solidFill>
+              <a:latin typeface="Yanone Kaffeesatz Regular" panose="02000000000000000000" pitchFamily="2" charset="0"/>
+            </a:endParaRPr>
           </a:p>
         </p:txBody>
       </p:sp>
       <p:pic>
         <p:nvPicPr>
-          <p:cNvPr id="3" name="Picture 2"/>
+          <p:cNvPr id="1026" name="Picture 2" descr="the Octobi Wan Catnobi">
+            <a:extLst>
+              <a:ext uri="{FF2B5EF4-FFF2-40B4-BE49-F238E27FC236}">
+                <a16:creationId xmlns:a16="http://schemas.microsoft.com/office/drawing/2014/main" id="{4B32D527-79EC-4580-AF79-AE67BED457F2}"/>
+              </a:ext>
+            </a:extLst>
+          </p:cNvPr>
           <p:cNvPicPr>
-            <a:picLocks noChangeAspect="1"/>
+            <a:picLocks noChangeAspect="1" noChangeArrowheads="1"/>
           </p:cNvPicPr>
           <p:nvPr/>
         </p:nvPicPr>
@@ -8012,24 +10842,88 @@
               </a:ext>
             </a:extLst>
           </a:blip>
+          <a:srcRect/>
           <a:stretch>
             <a:fillRect/>
           </a:stretch>
         </p:blipFill>
-        <p:spPr>
+        <p:spPr bwMode="auto">
           <a:xfrm>
-            <a:off x="8052306" y="612519"/>
-            <a:ext cx="2880000" cy="690817"/>
+            <a:off x="4539761" y="146537"/>
+            <a:ext cx="3112477" cy="3112477"/>
           </a:xfrm>
           <a:prstGeom prst="rect">
             <a:avLst/>
           </a:prstGeom>
+          <a:noFill/>
+          <a:extLst>
+            <a:ext uri="{909E8E84-426E-40DD-AFC4-6F175D3DCCD1}">
+              <a14:hiddenFill xmlns:a14="http://schemas.microsoft.com/office/drawing/2010/main">
+                <a:solidFill>
+                  <a:srgbClr val="FFFFFF"/>
+                </a:solidFill>
+              </a14:hiddenFill>
+            </a:ext>
+          </a:extLst>
         </p:spPr>
       </p:pic>
+      <p:sp>
+        <p:nvSpPr>
+          <p:cNvPr id="3" name="TextBox 2">
+            <a:extLst>
+              <a:ext uri="{FF2B5EF4-FFF2-40B4-BE49-F238E27FC236}">
+                <a16:creationId xmlns:a16="http://schemas.microsoft.com/office/drawing/2014/main" id="{A499C352-3B36-4C53-865C-87D8BDA9C775}"/>
+              </a:ext>
+            </a:extLst>
+          </p:cNvPr>
+          <p:cNvSpPr txBox="1"/>
+          <p:nvPr/>
+        </p:nvSpPr>
+        <p:spPr>
+          <a:xfrm>
+            <a:off x="9198873" y="6488668"/>
+            <a:ext cx="2993127" cy="369332"/>
+          </a:xfrm>
+          <a:prstGeom prst="rect">
+            <a:avLst/>
+          </a:prstGeom>
+          <a:noFill/>
+        </p:spPr>
+        <p:txBody>
+          <a:bodyPr wrap="none" rtlCol="0">
+            <a:spAutoFit/>
+          </a:bodyPr>
+          <a:lstStyle/>
+          <a:p>
+            <a:r>
+              <a:rPr lang="en-US" dirty="0">
+                <a:solidFill>
+                  <a:schemeClr val="accent3"/>
+                </a:solidFill>
+                <a:latin typeface="Yanone Kaffeesatz Regular" panose="02000000000000000000" pitchFamily="2" charset="0"/>
+                <a:hlinkClick r:id="rId4">
+                  <a:extLst>
+                    <a:ext uri="{A12FA001-AC4F-418D-AE19-62706E023703}">
+                      <ahyp:hlinkClr xmlns:ahyp="http://schemas.microsoft.com/office/drawing/2018/hyperlinkcolor" val="tx"/>
+                    </a:ext>
+                  </a:extLst>
+                </a:hlinkClick>
+              </a:rPr>
+              <a:t>https://octodex.github.com/octobiwan</a:t>
+            </a:r>
+            <a:endParaRPr lang="en-US" dirty="0">
+              <a:solidFill>
+                <a:schemeClr val="accent3"/>
+              </a:solidFill>
+              <a:latin typeface="Yanone Kaffeesatz Regular" panose="02000000000000000000" pitchFamily="2" charset="0"/>
+            </a:endParaRPr>
+          </a:p>
+        </p:txBody>
+      </p:sp>
     </p:spTree>
     <p:extLst>
       <p:ext uri="{BB962C8B-B14F-4D97-AF65-F5344CB8AC3E}">
-        <p14:creationId xmlns:p14="http://schemas.microsoft.com/office/powerpoint/2010/main" val="3887468163"/>
+        <p14:creationId xmlns:p14="http://schemas.microsoft.com/office/powerpoint/2010/main" val="3106064596"/>
       </p:ext>
     </p:extLst>
   </p:cSld>

</xml_diff>